<commit_message>
zavrsena prezentacija za distribuirane baze
</commit_message>
<xml_diff>
--- a/Distribuirane baze/Distribuirane baze podataka.pptx
+++ b/Distribuirane baze/Distribuirane baze podataka.pptx
@@ -15,6 +15,18 @@
     <p:sldId id="262" r:id="rId9"/>
     <p:sldId id="264" r:id="rId10"/>
     <p:sldId id="265" r:id="rId11"/>
+    <p:sldId id="266" r:id="rId12"/>
+    <p:sldId id="267" r:id="rId13"/>
+    <p:sldId id="268" r:id="rId14"/>
+    <p:sldId id="269" r:id="rId15"/>
+    <p:sldId id="270" r:id="rId16"/>
+    <p:sldId id="271" r:id="rId17"/>
+    <p:sldId id="272" r:id="rId18"/>
+    <p:sldId id="273" r:id="rId19"/>
+    <p:sldId id="274" r:id="rId20"/>
+    <p:sldId id="275" r:id="rId21"/>
+    <p:sldId id="276" r:id="rId22"/>
+    <p:sldId id="277" r:id="rId23"/>
   </p:sldIdLst>
   <p:sldSz cx="12192000" cy="6858000"/>
   <p:notesSz cx="6858000" cy="9144000"/>
@@ -113,6 +125,11 @@
       </a:defRPr>
     </a:lvl9pPr>
   </p:defaultTextStyle>
+  <p:extLst>
+    <p:ext uri="{EFAFB233-063F-42B5-8137-9DF3F51BA10A}">
+      <p15:sldGuideLst xmlns:p15="http://schemas.microsoft.com/office/powerpoint/2012/main"/>
+    </p:ext>
+  </p:extLst>
 </p:presentation>
 </file>
 
@@ -6237,10 +6254,10 @@
           <a:lstStyle/>
           <a:p>
             <a:r>
-              <a:rPr lang="sr-Latn-RS" smtClean="0"/>
+              <a:rPr lang="sr-Latn-RS" dirty="0" smtClean="0"/>
               <a:t>Couchbase baza podataka</a:t>
             </a:r>
-            <a:endParaRPr lang="en-US"/>
+            <a:endParaRPr lang="en-US" dirty="0"/>
           </a:p>
         </p:txBody>
       </p:sp>
@@ -6259,7 +6276,111 @@
           <a:bodyPr/>
           <a:lstStyle/>
           <a:p>
-            <a:endParaRPr lang="en-US"/>
+            <a:r>
+              <a:rPr lang="en-US" dirty="0"/>
+              <a:t>Couchbase je open source </a:t>
+            </a:r>
+            <a:r>
+              <a:rPr lang="sr-Latn-RS" dirty="0" smtClean="0"/>
+              <a:t>distribuirana baza podataka, nastala</a:t>
+            </a:r>
+            <a:r>
+              <a:rPr lang="en-US" dirty="0" smtClean="0"/>
+              <a:t> </a:t>
+            </a:r>
+            <a:r>
+              <a:rPr lang="sr-Latn-RS" dirty="0" smtClean="0"/>
+              <a:t>spajanjem</a:t>
+            </a:r>
+            <a:r>
+              <a:rPr lang="en-US" dirty="0" smtClean="0"/>
+              <a:t> </a:t>
+            </a:r>
+            <a:r>
+              <a:rPr lang="sr-Latn-RS" dirty="0" smtClean="0"/>
+              <a:t>dva rešenja baze podataka </a:t>
+            </a:r>
+            <a:r>
+              <a:rPr lang="en-US" dirty="0" smtClean="0"/>
+              <a:t>– </a:t>
+            </a:r>
+            <a:r>
+              <a:rPr lang="sr-Latn-RS" dirty="0" err="1"/>
+              <a:t>CouchDB</a:t>
+            </a:r>
+            <a:r>
+              <a:rPr lang="en-US" dirty="0"/>
+              <a:t> </a:t>
+            </a:r>
+            <a:r>
+              <a:rPr lang="en-US" dirty="0" err="1"/>
+              <a:t>i</a:t>
+            </a:r>
+            <a:r>
+              <a:rPr lang="en-US" dirty="0"/>
+              <a:t> </a:t>
+            </a:r>
+            <a:r>
+              <a:rPr lang="en-US" dirty="0" err="1"/>
+              <a:t>Membase</a:t>
+            </a:r>
+            <a:endParaRPr lang="en-US" dirty="0"/>
+          </a:p>
+          <a:p>
+            <a:r>
+              <a:rPr lang="en-US" dirty="0" smtClean="0"/>
+              <a:t>S</a:t>
+            </a:r>
+            <a:r>
+              <a:rPr lang="sr-Latn-RS" dirty="0" smtClean="0"/>
+              <a:t>pada </a:t>
+            </a:r>
+            <a:r>
+              <a:rPr lang="sr-Latn-RS" dirty="0"/>
+              <a:t>u grupu </a:t>
+            </a:r>
+            <a:r>
+              <a:rPr lang="sr-Latn-RS" dirty="0" err="1"/>
+              <a:t>document</a:t>
+            </a:r>
+            <a:r>
+              <a:rPr lang="sr-Latn-RS" dirty="0"/>
+              <a:t> baza </a:t>
+            </a:r>
+            <a:r>
+              <a:rPr lang="sr-Latn-RS" dirty="0" smtClean="0"/>
+              <a:t>podataka</a:t>
+            </a:r>
+            <a:endParaRPr lang="en-US" dirty="0" smtClean="0"/>
+          </a:p>
+          <a:p>
+            <a:r>
+              <a:rPr lang="sr-Latn-RS" dirty="0"/>
+              <a:t>Za predstavljanje upita ka bazi koristi se bogat upitni jezik nazvan </a:t>
+            </a:r>
+            <a:r>
+              <a:rPr lang="sr-Latn-RS" dirty="0" smtClean="0"/>
+              <a:t>N1QL</a:t>
+            </a:r>
+            <a:endParaRPr lang="en-US" dirty="0" smtClean="0"/>
+          </a:p>
+          <a:p>
+            <a:r>
+              <a:rPr lang="sr-Latn-RS" dirty="0"/>
+              <a:t>Podaci se kod Couchbase servera mogu čuvati na dva načina - samo u radnoj memoriji (RAM) ili kombinovano u radnoj memoriji i na </a:t>
+            </a:r>
+            <a:r>
+              <a:rPr lang="sr-Latn-RS" dirty="0" smtClean="0"/>
+              <a:t>disku</a:t>
+            </a:r>
+            <a:endParaRPr lang="en-US" dirty="0" smtClean="0"/>
+          </a:p>
+          <a:p>
+            <a:r>
+              <a:rPr lang="sr-Latn-RS" dirty="0" smtClean="0"/>
+              <a:t>Po CAP teoremi se može svrstati u CP ili AP</a:t>
+            </a:r>
+            <a:endParaRPr lang="sr-Latn-RS" dirty="0"/>
           </a:p>
         </p:txBody>
       </p:sp>
@@ -6280,6 +6401,1588 @@
       </p:par>
     </p:tnLst>
   </p:timing>
+</p:sld>
+</file>
+
+<file path=ppt/slides/slide11.xml><?xml version="1.0" encoding="utf-8"?>
+<p:sld xmlns:a="http://schemas.openxmlformats.org/drawingml/2006/main" xmlns:r="http://schemas.openxmlformats.org/officeDocument/2006/relationships" xmlns:p="http://schemas.openxmlformats.org/presentationml/2006/main">
+  <p:cSld>
+    <p:spTree>
+      <p:nvGrpSpPr>
+        <p:cNvPr id="1" name=""/>
+        <p:cNvGrpSpPr/>
+        <p:nvPr/>
+      </p:nvGrpSpPr>
+      <p:grpSpPr>
+        <a:xfrm>
+          <a:off x="0" y="0"/>
+          <a:ext cx="0" cy="0"/>
+          <a:chOff x="0" y="0"/>
+          <a:chExt cx="0" cy="0"/>
+        </a:xfrm>
+      </p:grpSpPr>
+      <p:sp>
+        <p:nvSpPr>
+          <p:cNvPr id="2" name="Title 1"/>
+          <p:cNvSpPr>
+            <a:spLocks noGrp="1"/>
+          </p:cNvSpPr>
+          <p:nvPr>
+            <p:ph type="title"/>
+          </p:nvPr>
+        </p:nvSpPr>
+        <p:spPr/>
+        <p:txBody>
+          <a:bodyPr/>
+          <a:lstStyle/>
+          <a:p>
+            <a:r>
+              <a:rPr lang="sr-Latn-RS" dirty="0"/>
+              <a:t>Couchbase </a:t>
+            </a:r>
+            <a:r>
+              <a:rPr lang="sr-Latn-RS" dirty="0" smtClean="0"/>
+              <a:t>klaster</a:t>
+            </a:r>
+            <a:r>
+              <a:rPr lang="sr-Latn-RS" dirty="0"/>
+              <a:t> </a:t>
+            </a:r>
+            <a:r>
+              <a:rPr lang="sr-Latn-RS" dirty="0" smtClean="0"/>
+              <a:t>i servisi</a:t>
+            </a:r>
+            <a:endParaRPr lang="sr-Latn-RS" dirty="0"/>
+          </a:p>
+        </p:txBody>
+      </p:sp>
+      <p:sp>
+        <p:nvSpPr>
+          <p:cNvPr id="3" name="Content Placeholder 2"/>
+          <p:cNvSpPr>
+            <a:spLocks noGrp="1"/>
+          </p:cNvSpPr>
+          <p:nvPr>
+            <p:ph idx="1"/>
+          </p:nvPr>
+        </p:nvSpPr>
+        <p:spPr/>
+        <p:txBody>
+          <a:bodyPr/>
+          <a:lstStyle/>
+          <a:p>
+            <a:r>
+              <a:rPr lang="sr-Latn-RS" dirty="0"/>
+              <a:t>Couchbase klaster se sastoji od jedne ili više instanci Couchbase servera pri čemu se svaki server pokreće na nezavisnom </a:t>
+            </a:r>
+            <a:r>
+              <a:rPr lang="sr-Latn-RS" dirty="0" smtClean="0"/>
+              <a:t>čvoru</a:t>
+            </a:r>
+            <a:endParaRPr lang="en-US" dirty="0" smtClean="0"/>
+          </a:p>
+          <a:p>
+            <a:r>
+              <a:rPr lang="en-US" dirty="0" smtClean="0"/>
+              <a:t>N</a:t>
+            </a:r>
+            <a:r>
+              <a:rPr lang="sr-Latn-RS" dirty="0" smtClean="0"/>
+              <a:t>a </a:t>
+            </a:r>
+            <a:r>
+              <a:rPr lang="sr-Latn-RS" dirty="0"/>
+              <a:t>svakom čvoru je pokrenut Couchbase </a:t>
+            </a:r>
+            <a:r>
+              <a:rPr lang="sr-Latn-RS" dirty="0" err="1"/>
+              <a:t>Cluster</a:t>
+            </a:r>
+            <a:r>
+              <a:rPr lang="sr-Latn-RS" dirty="0"/>
+              <a:t> </a:t>
+            </a:r>
+            <a:r>
+              <a:rPr lang="sr-Latn-RS" dirty="0" err="1"/>
+              <a:t>Manager</a:t>
+            </a:r>
+            <a:r>
+              <a:rPr lang="sr-Latn-RS" dirty="0"/>
+              <a:t> koji upravlja komunikacijom između čvorova i obezbeđuje da su svi čvorovi </a:t>
+            </a:r>
+            <a:r>
+              <a:rPr lang="sr-Latn-RS" dirty="0" smtClean="0"/>
+              <a:t>stabilni</a:t>
+            </a:r>
+          </a:p>
+          <a:p>
+            <a:r>
+              <a:rPr lang="sr-Latn-RS" dirty="0"/>
+              <a:t>Svaki servis se može </a:t>
+            </a:r>
+            <a:r>
+              <a:rPr lang="sr-Latn-RS" dirty="0" err="1"/>
+              <a:t>deploy-ovati</a:t>
+            </a:r>
+            <a:r>
+              <a:rPr lang="sr-Latn-RS" dirty="0"/>
+              <a:t> i održavati nezavisno od ostalih i na taj način obezbeđuje veliku sposobnost </a:t>
+            </a:r>
+            <a:r>
+              <a:rPr lang="sr-Latn-RS" dirty="0" err="1"/>
+              <a:t>skaliranja</a:t>
+            </a:r>
+            <a:r>
+              <a:rPr lang="sr-Latn-RS" dirty="0"/>
+              <a:t> </a:t>
+            </a:r>
+            <a:r>
+              <a:rPr lang="sr-Latn-RS" dirty="0" smtClean="0"/>
+              <a:t>sistema</a:t>
+            </a:r>
+          </a:p>
+          <a:p>
+            <a:r>
+              <a:rPr lang="sr-Latn-RS" dirty="0" smtClean="0"/>
+              <a:t>Couchbase podržava sledeće servise: Data, </a:t>
+            </a:r>
+            <a:r>
+              <a:rPr lang="sr-Latn-RS" dirty="0" err="1" smtClean="0"/>
+              <a:t>Query</a:t>
+            </a:r>
+            <a:r>
+              <a:rPr lang="sr-Latn-RS" dirty="0" smtClean="0"/>
+              <a:t>, </a:t>
+            </a:r>
+            <a:r>
+              <a:rPr lang="sr-Latn-RS" dirty="0" err="1" smtClean="0"/>
+              <a:t>Index</a:t>
+            </a:r>
+            <a:r>
+              <a:rPr lang="sr-Latn-RS" dirty="0" smtClean="0"/>
+              <a:t>, </a:t>
+            </a:r>
+            <a:r>
+              <a:rPr lang="sr-Latn-RS" dirty="0" err="1" smtClean="0"/>
+              <a:t>Search</a:t>
+            </a:r>
+            <a:r>
+              <a:rPr lang="sr-Latn-RS" dirty="0" smtClean="0"/>
+              <a:t>, </a:t>
+            </a:r>
+            <a:r>
+              <a:rPr lang="sr-Latn-RS" dirty="0" err="1" smtClean="0"/>
+              <a:t>Analytics</a:t>
+            </a:r>
+            <a:r>
+              <a:rPr lang="sr-Latn-RS" dirty="0" smtClean="0"/>
+              <a:t>, </a:t>
+            </a:r>
+            <a:r>
+              <a:rPr lang="sr-Latn-RS" dirty="0" err="1" smtClean="0"/>
+              <a:t>Eventing</a:t>
+            </a:r>
+            <a:endParaRPr lang="en-US" dirty="0"/>
+          </a:p>
+        </p:txBody>
+      </p:sp>
+    </p:spTree>
+    <p:extLst>
+      <p:ext uri="{BB962C8B-B14F-4D97-AF65-F5344CB8AC3E}">
+        <p14:creationId xmlns:p14="http://schemas.microsoft.com/office/powerpoint/2010/main" val="3174897274"/>
+      </p:ext>
+    </p:extLst>
+  </p:cSld>
+  <p:clrMapOvr>
+    <a:masterClrMapping/>
+  </p:clrMapOvr>
+</p:sld>
+</file>
+
+<file path=ppt/slides/slide12.xml><?xml version="1.0" encoding="utf-8"?>
+<p:sld xmlns:a="http://schemas.openxmlformats.org/drawingml/2006/main" xmlns:r="http://schemas.openxmlformats.org/officeDocument/2006/relationships" xmlns:p="http://schemas.openxmlformats.org/presentationml/2006/main">
+  <p:cSld>
+    <p:spTree>
+      <p:nvGrpSpPr>
+        <p:cNvPr id="1" name=""/>
+        <p:cNvGrpSpPr/>
+        <p:nvPr/>
+      </p:nvGrpSpPr>
+      <p:grpSpPr>
+        <a:xfrm>
+          <a:off x="0" y="0"/>
+          <a:ext cx="0" cy="0"/>
+          <a:chOff x="0" y="0"/>
+          <a:chExt cx="0" cy="0"/>
+        </a:xfrm>
+      </p:grpSpPr>
+      <p:sp>
+        <p:nvSpPr>
+          <p:cNvPr id="2" name="Title 1"/>
+          <p:cNvSpPr>
+            <a:spLocks noGrp="1"/>
+          </p:cNvSpPr>
+          <p:nvPr>
+            <p:ph type="title"/>
+          </p:nvPr>
+        </p:nvSpPr>
+        <p:spPr/>
+        <p:txBody>
+          <a:bodyPr/>
+          <a:lstStyle/>
+          <a:p>
+            <a:r>
+              <a:rPr lang="sr-Latn-RS" dirty="0" smtClean="0"/>
+              <a:t>Primer dva Couchbase klastera</a:t>
+            </a:r>
+            <a:endParaRPr lang="en-US" dirty="0"/>
+          </a:p>
+        </p:txBody>
+      </p:sp>
+      <p:pic>
+        <p:nvPicPr>
+          <p:cNvPr id="4" name="Picture 3" descr="cbClusterWithServicesDevelopment"/>
+          <p:cNvPicPr/>
+          <p:nvPr/>
+        </p:nvPicPr>
+        <p:blipFill>
+          <a:blip r:embed="rId2">
+            <a:extLst>
+              <a:ext uri="{28A0092B-C50C-407E-A947-70E740481C1C}">
+                <a14:useLocalDpi xmlns:a14="http://schemas.microsoft.com/office/drawing/2010/main" val="0"/>
+              </a:ext>
+            </a:extLst>
+          </a:blip>
+          <a:srcRect/>
+          <a:stretch>
+            <a:fillRect/>
+          </a:stretch>
+        </p:blipFill>
+        <p:spPr bwMode="auto">
+          <a:xfrm>
+            <a:off x="254225" y="2374174"/>
+            <a:ext cx="5852660" cy="3749040"/>
+          </a:xfrm>
+          <a:prstGeom prst="rect">
+            <a:avLst/>
+          </a:prstGeom>
+          <a:noFill/>
+          <a:ln>
+            <a:noFill/>
+          </a:ln>
+        </p:spPr>
+      </p:pic>
+      <p:pic>
+        <p:nvPicPr>
+          <p:cNvPr id="5" name="Picture 4" descr="cbClusterWithServicesProduction"/>
+          <p:cNvPicPr/>
+          <p:nvPr/>
+        </p:nvPicPr>
+        <p:blipFill>
+          <a:blip r:embed="rId3" cstate="print">
+            <a:extLst>
+              <a:ext uri="{28A0092B-C50C-407E-A947-70E740481C1C}">
+                <a14:useLocalDpi xmlns:a14="http://schemas.microsoft.com/office/drawing/2010/main" val="0"/>
+              </a:ext>
+            </a:extLst>
+          </a:blip>
+          <a:srcRect/>
+          <a:stretch>
+            <a:fillRect/>
+          </a:stretch>
+        </p:blipFill>
+        <p:spPr bwMode="auto">
+          <a:xfrm>
+            <a:off x="6384470" y="2374174"/>
+            <a:ext cx="5682343" cy="3749040"/>
+          </a:xfrm>
+          <a:prstGeom prst="rect">
+            <a:avLst/>
+          </a:prstGeom>
+          <a:noFill/>
+          <a:ln>
+            <a:noFill/>
+          </a:ln>
+        </p:spPr>
+      </p:pic>
+    </p:spTree>
+    <p:extLst>
+      <p:ext uri="{BB962C8B-B14F-4D97-AF65-F5344CB8AC3E}">
+        <p14:creationId xmlns:p14="http://schemas.microsoft.com/office/powerpoint/2010/main" val="2729278082"/>
+      </p:ext>
+    </p:extLst>
+  </p:cSld>
+  <p:clrMapOvr>
+    <a:masterClrMapping/>
+  </p:clrMapOvr>
+</p:sld>
+</file>
+
+<file path=ppt/slides/slide13.xml><?xml version="1.0" encoding="utf-8"?>
+<p:sld xmlns:a="http://schemas.openxmlformats.org/drawingml/2006/main" xmlns:r="http://schemas.openxmlformats.org/officeDocument/2006/relationships" xmlns:p="http://schemas.openxmlformats.org/presentationml/2006/main">
+  <p:cSld>
+    <p:spTree>
+      <p:nvGrpSpPr>
+        <p:cNvPr id="1" name=""/>
+        <p:cNvGrpSpPr/>
+        <p:nvPr/>
+      </p:nvGrpSpPr>
+      <p:grpSpPr>
+        <a:xfrm>
+          <a:off x="0" y="0"/>
+          <a:ext cx="0" cy="0"/>
+          <a:chOff x="0" y="0"/>
+          <a:chExt cx="0" cy="0"/>
+        </a:xfrm>
+      </p:grpSpPr>
+      <p:sp>
+        <p:nvSpPr>
+          <p:cNvPr id="2" name="Title 1"/>
+          <p:cNvSpPr>
+            <a:spLocks noGrp="1"/>
+          </p:cNvSpPr>
+          <p:nvPr>
+            <p:ph type="title"/>
+          </p:nvPr>
+        </p:nvSpPr>
+        <p:spPr/>
+        <p:txBody>
+          <a:bodyPr/>
+          <a:lstStyle/>
+          <a:p>
+            <a:r>
+              <a:rPr lang="sr-Latn-RS" dirty="0" smtClean="0"/>
+              <a:t>Struktura podataka i </a:t>
+            </a:r>
+            <a:r>
+              <a:rPr lang="sr-Latn-RS" dirty="0" err="1" smtClean="0"/>
+              <a:t>bucketi</a:t>
+            </a:r>
+            <a:endParaRPr lang="en-US" dirty="0"/>
+          </a:p>
+        </p:txBody>
+      </p:sp>
+      <p:sp>
+        <p:nvSpPr>
+          <p:cNvPr id="3" name="Content Placeholder 2"/>
+          <p:cNvSpPr>
+            <a:spLocks noGrp="1"/>
+          </p:cNvSpPr>
+          <p:nvPr>
+            <p:ph idx="1"/>
+          </p:nvPr>
+        </p:nvSpPr>
+        <p:spPr>
+          <a:xfrm>
+            <a:off x="1103312" y="2052918"/>
+            <a:ext cx="5787345" cy="4592811"/>
+          </a:xfrm>
+        </p:spPr>
+        <p:txBody>
+          <a:bodyPr/>
+          <a:lstStyle/>
+          <a:p>
+            <a:r>
+              <a:rPr lang="sr-Latn-RS" dirty="0"/>
+              <a:t>Maksimalna veličina podatka </a:t>
+            </a:r>
+            <a:r>
+              <a:rPr lang="sr-Latn-RS"/>
+              <a:t>je </a:t>
+            </a:r>
+            <a:r>
+              <a:rPr lang="sr-Latn-RS" smtClean="0"/>
+              <a:t>20 MB </a:t>
+            </a:r>
+            <a:endParaRPr lang="sr-Latn-RS" dirty="0" smtClean="0"/>
+          </a:p>
+          <a:p>
+            <a:r>
+              <a:rPr lang="sr-Latn-RS" dirty="0" smtClean="0"/>
+              <a:t>Podaci </a:t>
+            </a:r>
+            <a:r>
+              <a:rPr lang="sr-Latn-RS" dirty="0"/>
+              <a:t>se mogu čuvati u dva </a:t>
+            </a:r>
+            <a:r>
+              <a:rPr lang="sr-Latn-RS" dirty="0" smtClean="0"/>
+              <a:t>formata – </a:t>
+            </a:r>
+            <a:r>
+              <a:rPr lang="sr-Latn-RS" dirty="0" err="1" smtClean="0"/>
+              <a:t>Binary</a:t>
+            </a:r>
+            <a:r>
+              <a:rPr lang="sr-Latn-RS" dirty="0" smtClean="0"/>
+              <a:t> ili JSON formatu</a:t>
+            </a:r>
+          </a:p>
+          <a:p>
+            <a:r>
+              <a:rPr lang="sr-Latn-RS" dirty="0"/>
+              <a:t>Couchbase server čuva podatke u </a:t>
+            </a:r>
+            <a:r>
+              <a:rPr lang="sr-Latn-RS" dirty="0" err="1"/>
+              <a:t>Bucket</a:t>
+            </a:r>
+            <a:r>
+              <a:rPr lang="sr-Latn-RS" dirty="0"/>
+              <a:t>-ima koji povezuju logički povezane grupe </a:t>
+            </a:r>
+            <a:r>
+              <a:rPr lang="sr-Latn-RS" dirty="0" err="1"/>
+              <a:t>key-value</a:t>
+            </a:r>
+            <a:r>
+              <a:rPr lang="sr-Latn-RS" dirty="0"/>
+              <a:t> </a:t>
+            </a:r>
+            <a:r>
+              <a:rPr lang="sr-Latn-RS" dirty="0" smtClean="0"/>
+              <a:t>parova</a:t>
+            </a:r>
+          </a:p>
+          <a:p>
+            <a:r>
+              <a:rPr lang="sr-Latn-RS" dirty="0"/>
+              <a:t>Svaki klaster može sadržati najviše 30 </a:t>
+            </a:r>
+            <a:r>
+              <a:rPr lang="sr-Latn-RS" dirty="0" err="1" smtClean="0"/>
+              <a:t>bucket</a:t>
+            </a:r>
+            <a:r>
+              <a:rPr lang="sr-Latn-RS" dirty="0" smtClean="0"/>
+              <a:t>-a</a:t>
+            </a:r>
+          </a:p>
+          <a:p>
+            <a:r>
+              <a:rPr lang="sr-Latn-RS" dirty="0" smtClean="0"/>
+              <a:t>Postoje 3 vrste </a:t>
+            </a:r>
+            <a:r>
+              <a:rPr lang="sr-Latn-RS" dirty="0" err="1" smtClean="0"/>
+              <a:t>bucketa</a:t>
+            </a:r>
+            <a:r>
+              <a:rPr lang="sr-Latn-RS" dirty="0" smtClean="0"/>
+              <a:t>: </a:t>
+            </a:r>
+          </a:p>
+          <a:p>
+            <a:pPr lvl="1"/>
+            <a:r>
+              <a:rPr lang="sr-Latn-RS" dirty="0"/>
+              <a:t>Couchbase </a:t>
+            </a:r>
+            <a:r>
+              <a:rPr lang="sr-Latn-RS" dirty="0" err="1" smtClean="0"/>
+              <a:t>bucket</a:t>
+            </a:r>
+            <a:endParaRPr lang="sr-Latn-RS" dirty="0" smtClean="0"/>
+          </a:p>
+          <a:p>
+            <a:pPr lvl="1"/>
+            <a:r>
+              <a:rPr lang="sr-Latn-RS" dirty="0" err="1"/>
+              <a:t>Ephemeral</a:t>
+            </a:r>
+            <a:r>
+              <a:rPr lang="sr-Latn-RS" dirty="0"/>
+              <a:t> </a:t>
+            </a:r>
+            <a:r>
+              <a:rPr lang="sr-Latn-RS" dirty="0" err="1" smtClean="0"/>
+              <a:t>bucket</a:t>
+            </a:r>
+            <a:endParaRPr lang="sr-Latn-RS" dirty="0" smtClean="0"/>
+          </a:p>
+          <a:p>
+            <a:pPr lvl="1"/>
+            <a:r>
+              <a:rPr lang="sr-Latn-RS" dirty="0" err="1"/>
+              <a:t>Memcached</a:t>
+            </a:r>
+            <a:r>
+              <a:rPr lang="sr-Latn-RS" dirty="0"/>
+              <a:t> </a:t>
+            </a:r>
+            <a:r>
+              <a:rPr lang="sr-Latn-RS" dirty="0" err="1"/>
+              <a:t>bucket</a:t>
+            </a:r>
+            <a:endParaRPr lang="sr-Latn-RS" dirty="0" smtClean="0"/>
+          </a:p>
+          <a:p>
+            <a:endParaRPr lang="en-US" dirty="0"/>
+          </a:p>
+        </p:txBody>
+      </p:sp>
+      <p:pic>
+        <p:nvPicPr>
+          <p:cNvPr id="1026" name="Picture 2" descr="item-maximum-sizes"/>
+          <p:cNvPicPr>
+            <a:picLocks noChangeAspect="1" noChangeArrowheads="1"/>
+          </p:cNvPicPr>
+          <p:nvPr/>
+        </p:nvPicPr>
+        <p:blipFill>
+          <a:blip r:embed="rId2" cstate="print">
+            <a:extLst>
+              <a:ext uri="{28A0092B-C50C-407E-A947-70E740481C1C}">
+                <a14:useLocalDpi xmlns:a14="http://schemas.microsoft.com/office/drawing/2010/main" val="0"/>
+              </a:ext>
+            </a:extLst>
+          </a:blip>
+          <a:srcRect/>
+          <a:stretch>
+            <a:fillRect/>
+          </a:stretch>
+        </p:blipFill>
+        <p:spPr bwMode="auto">
+          <a:xfrm>
+            <a:off x="7186944" y="2052918"/>
+            <a:ext cx="4660342" cy="3696379"/>
+          </a:xfrm>
+          <a:prstGeom prst="rect">
+            <a:avLst/>
+          </a:prstGeom>
+          <a:noFill/>
+          <a:ln>
+            <a:noFill/>
+          </a:ln>
+          <a:extLst>
+            <a:ext uri="{909E8E84-426E-40DD-AFC4-6F175D3DCCD1}">
+              <a14:hiddenFill xmlns:a14="http://schemas.microsoft.com/office/drawing/2010/main">
+                <a:solidFill>
+                  <a:srgbClr val="FFFFFF"/>
+                </a:solidFill>
+              </a14:hiddenFill>
+            </a:ext>
+            <a:ext uri="{91240B29-F687-4F45-9708-019B960494DF}">
+              <a14:hiddenLine xmlns:a14="http://schemas.microsoft.com/office/drawing/2010/main" w="9525">
+                <a:solidFill>
+                  <a:srgbClr val="000000"/>
+                </a:solidFill>
+                <a:miter lim="800000"/>
+                <a:headEnd/>
+                <a:tailEnd/>
+              </a14:hiddenLine>
+            </a:ext>
+          </a:extLst>
+        </p:spPr>
+      </p:pic>
+    </p:spTree>
+    <p:extLst>
+      <p:ext uri="{BB962C8B-B14F-4D97-AF65-F5344CB8AC3E}">
+        <p14:creationId xmlns:p14="http://schemas.microsoft.com/office/powerpoint/2010/main" val="32800292"/>
+      </p:ext>
+    </p:extLst>
+  </p:cSld>
+  <p:clrMapOvr>
+    <a:masterClrMapping/>
+  </p:clrMapOvr>
+</p:sld>
+</file>
+
+<file path=ppt/slides/slide14.xml><?xml version="1.0" encoding="utf-8"?>
+<p:sld xmlns:a="http://schemas.openxmlformats.org/drawingml/2006/main" xmlns:r="http://schemas.openxmlformats.org/officeDocument/2006/relationships" xmlns:p="http://schemas.openxmlformats.org/presentationml/2006/main">
+  <p:cSld>
+    <p:spTree>
+      <p:nvGrpSpPr>
+        <p:cNvPr id="1" name=""/>
+        <p:cNvGrpSpPr/>
+        <p:nvPr/>
+      </p:nvGrpSpPr>
+      <p:grpSpPr>
+        <a:xfrm>
+          <a:off x="0" y="0"/>
+          <a:ext cx="0" cy="0"/>
+          <a:chOff x="0" y="0"/>
+          <a:chExt cx="0" cy="0"/>
+        </a:xfrm>
+      </p:grpSpPr>
+      <p:sp>
+        <p:nvSpPr>
+          <p:cNvPr id="2" name="Title 1"/>
+          <p:cNvSpPr>
+            <a:spLocks noGrp="1"/>
+          </p:cNvSpPr>
+          <p:nvPr>
+            <p:ph type="title"/>
+          </p:nvPr>
+        </p:nvSpPr>
+        <p:spPr/>
+        <p:txBody>
+          <a:bodyPr/>
+          <a:lstStyle/>
+          <a:p>
+            <a:r>
+              <a:rPr lang="sr-Latn-RS" dirty="0" smtClean="0"/>
+              <a:t>Trajnost upisa (</a:t>
+            </a:r>
+            <a:r>
+              <a:rPr lang="sr-Latn-RS" dirty="0" err="1" smtClean="0"/>
+              <a:t>Durability</a:t>
+            </a:r>
+            <a:r>
+              <a:rPr lang="sr-Latn-RS" dirty="0" smtClean="0"/>
+              <a:t>)</a:t>
+            </a:r>
+            <a:endParaRPr lang="en-US" dirty="0"/>
+          </a:p>
+        </p:txBody>
+      </p:sp>
+      <p:sp>
+        <p:nvSpPr>
+          <p:cNvPr id="3" name="Content Placeholder 2"/>
+          <p:cNvSpPr>
+            <a:spLocks noGrp="1"/>
+          </p:cNvSpPr>
+          <p:nvPr>
+            <p:ph idx="1"/>
+          </p:nvPr>
+        </p:nvSpPr>
+        <p:spPr/>
+        <p:txBody>
+          <a:bodyPr/>
+          <a:lstStyle/>
+          <a:p>
+            <a:r>
+              <a:rPr lang="sr-Latn-RS" dirty="0" smtClean="0"/>
+              <a:t>Klijenti navode prilikom upisa nivo trajnosti koji zahtevaju</a:t>
+            </a:r>
+          </a:p>
+          <a:p>
+            <a:r>
+              <a:rPr lang="sr-Latn-RS" dirty="0"/>
+              <a:t>Couchbase podržava trajnost upisa samo na nivou jednog </a:t>
+            </a:r>
+            <a:r>
+              <a:rPr lang="sr-Latn-RS" dirty="0" smtClean="0"/>
+              <a:t>dokumenta</a:t>
+            </a:r>
+          </a:p>
+          <a:p>
+            <a:r>
+              <a:rPr lang="sr-Latn-RS" dirty="0"/>
+              <a:t>Trajni upis je moguće obaviti nad najviše dve replike </a:t>
+            </a:r>
+            <a:r>
+              <a:rPr lang="sr-Latn-RS" dirty="0" smtClean="0"/>
+              <a:t>podataka</a:t>
+            </a:r>
+          </a:p>
+          <a:p>
+            <a:r>
+              <a:rPr lang="sr-Latn-RS" dirty="0"/>
+              <a:t>Couchbase </a:t>
+            </a:r>
+            <a:r>
+              <a:rPr lang="sr-Latn-RS" dirty="0" smtClean="0"/>
+              <a:t>podržava dve vrste upisa – regularni i trajni upis</a:t>
+            </a:r>
+            <a:endParaRPr lang="en-US" dirty="0"/>
+          </a:p>
+        </p:txBody>
+      </p:sp>
+    </p:spTree>
+    <p:extLst>
+      <p:ext uri="{BB962C8B-B14F-4D97-AF65-F5344CB8AC3E}">
+        <p14:creationId xmlns:p14="http://schemas.microsoft.com/office/powerpoint/2010/main" val="3441114354"/>
+      </p:ext>
+    </p:extLst>
+  </p:cSld>
+  <p:clrMapOvr>
+    <a:masterClrMapping/>
+  </p:clrMapOvr>
+</p:sld>
+</file>
+
+<file path=ppt/slides/slide15.xml><?xml version="1.0" encoding="utf-8"?>
+<p:sld xmlns:a="http://schemas.openxmlformats.org/drawingml/2006/main" xmlns:r="http://schemas.openxmlformats.org/officeDocument/2006/relationships" xmlns:p="http://schemas.openxmlformats.org/presentationml/2006/main">
+  <p:cSld>
+    <p:spTree>
+      <p:nvGrpSpPr>
+        <p:cNvPr id="1" name=""/>
+        <p:cNvGrpSpPr/>
+        <p:nvPr/>
+      </p:nvGrpSpPr>
+      <p:grpSpPr>
+        <a:xfrm>
+          <a:off x="0" y="0"/>
+          <a:ext cx="0" cy="0"/>
+          <a:chOff x="0" y="0"/>
+          <a:chExt cx="0" cy="0"/>
+        </a:xfrm>
+      </p:grpSpPr>
+      <p:sp>
+        <p:nvSpPr>
+          <p:cNvPr id="2" name="Title 1"/>
+          <p:cNvSpPr>
+            <a:spLocks noGrp="1"/>
+          </p:cNvSpPr>
+          <p:nvPr>
+            <p:ph type="title"/>
+          </p:nvPr>
+        </p:nvSpPr>
+        <p:spPr/>
+        <p:txBody>
+          <a:bodyPr/>
+          <a:lstStyle/>
+          <a:p>
+            <a:r>
+              <a:rPr lang="sr-Latn-RS" dirty="0" smtClean="0"/>
+              <a:t>Transakcije</a:t>
+            </a:r>
+            <a:endParaRPr lang="en-US" dirty="0"/>
+          </a:p>
+        </p:txBody>
+      </p:sp>
+      <p:sp>
+        <p:nvSpPr>
+          <p:cNvPr id="3" name="Content Placeholder 2"/>
+          <p:cNvSpPr>
+            <a:spLocks noGrp="1"/>
+          </p:cNvSpPr>
+          <p:nvPr>
+            <p:ph idx="1"/>
+          </p:nvPr>
+        </p:nvSpPr>
+        <p:spPr/>
+        <p:txBody>
+          <a:bodyPr/>
+          <a:lstStyle/>
+          <a:p>
+            <a:r>
+              <a:rPr lang="sr-Latn-RS" dirty="0" err="1"/>
+              <a:t>Atomičnost</a:t>
+            </a:r>
+            <a:r>
+              <a:rPr lang="sr-Latn-RS" dirty="0"/>
+              <a:t> je podržana kroz operacije dodavanja, ažuriranja i brisanja kroz bilo koji broj dokumenata</a:t>
+            </a:r>
+            <a:r>
+              <a:rPr lang="sr-Latn-RS" dirty="0" smtClean="0"/>
+              <a:t>.</a:t>
+            </a:r>
+          </a:p>
+          <a:p>
+            <a:r>
+              <a:rPr lang="sr-Latn-RS" dirty="0" smtClean="0"/>
+              <a:t>Trajnost </a:t>
+            </a:r>
+            <a:r>
+              <a:rPr lang="sr-Latn-RS" dirty="0"/>
+              <a:t>je obezbeđena sinhronim upisom</a:t>
+            </a:r>
+            <a:endParaRPr lang="sr-Latn-RS" dirty="0" smtClean="0"/>
+          </a:p>
+          <a:p>
+            <a:r>
+              <a:rPr lang="sr-Latn-RS" dirty="0" smtClean="0"/>
+              <a:t>Couchbase </a:t>
+            </a:r>
+            <a:r>
+              <a:rPr lang="sr-Latn-RS" dirty="0"/>
+              <a:t>podržava </a:t>
+            </a:r>
+            <a:r>
+              <a:rPr lang="sr-Latn-RS" dirty="0" smtClean="0"/>
+              <a:t>samo </a:t>
+            </a:r>
+            <a:r>
+              <a:rPr lang="sr-Latn-RS" dirty="0" err="1" smtClean="0"/>
+              <a:t>Read</a:t>
+            </a:r>
+            <a:r>
+              <a:rPr lang="sr-Latn-RS" dirty="0" smtClean="0"/>
+              <a:t> </a:t>
+            </a:r>
+            <a:r>
+              <a:rPr lang="sr-Latn-RS" dirty="0" err="1" smtClean="0"/>
+              <a:t>Commited</a:t>
+            </a:r>
+            <a:r>
+              <a:rPr lang="sr-Latn-RS" dirty="0" smtClean="0"/>
+              <a:t> nivo izolacije</a:t>
+            </a:r>
+          </a:p>
+          <a:p>
+            <a:r>
+              <a:rPr lang="sr-Latn-RS" dirty="0" smtClean="0"/>
+              <a:t>Transakcija </a:t>
+            </a:r>
+            <a:r>
+              <a:rPr lang="sr-Latn-RS" dirty="0"/>
+              <a:t>čuva izmene obavljane nad dokumentom kao </a:t>
+            </a:r>
+            <a:r>
+              <a:rPr lang="sr-Latn-RS" dirty="0" err="1"/>
+              <a:t>Extended</a:t>
+            </a:r>
+            <a:r>
+              <a:rPr lang="sr-Latn-RS" dirty="0"/>
+              <a:t> </a:t>
+            </a:r>
+            <a:r>
+              <a:rPr lang="sr-Latn-RS" dirty="0" smtClean="0"/>
+              <a:t>atribut dokumenta, to ima za posledicu ograničenje veličine dokumenata koji podržavaju transakcije na 10 MB</a:t>
+            </a:r>
+            <a:endParaRPr lang="en-US" dirty="0"/>
+          </a:p>
+        </p:txBody>
+      </p:sp>
+    </p:spTree>
+    <p:extLst>
+      <p:ext uri="{BB962C8B-B14F-4D97-AF65-F5344CB8AC3E}">
+        <p14:creationId xmlns:p14="http://schemas.microsoft.com/office/powerpoint/2010/main" val="3909308610"/>
+      </p:ext>
+    </p:extLst>
+  </p:cSld>
+  <p:clrMapOvr>
+    <a:masterClrMapping/>
+  </p:clrMapOvr>
+</p:sld>
+</file>
+
+<file path=ppt/slides/slide16.xml><?xml version="1.0" encoding="utf-8"?>
+<p:sld xmlns:a="http://schemas.openxmlformats.org/drawingml/2006/main" xmlns:r="http://schemas.openxmlformats.org/officeDocument/2006/relationships" xmlns:p="http://schemas.openxmlformats.org/presentationml/2006/main">
+  <p:cSld>
+    <p:spTree>
+      <p:nvGrpSpPr>
+        <p:cNvPr id="1" name=""/>
+        <p:cNvGrpSpPr/>
+        <p:nvPr/>
+      </p:nvGrpSpPr>
+      <p:grpSpPr>
+        <a:xfrm>
+          <a:off x="0" y="0"/>
+          <a:ext cx="0" cy="0"/>
+          <a:chOff x="0" y="0"/>
+          <a:chExt cx="0" cy="0"/>
+        </a:xfrm>
+      </p:grpSpPr>
+      <p:sp>
+        <p:nvSpPr>
+          <p:cNvPr id="2" name="Title 1"/>
+          <p:cNvSpPr>
+            <a:spLocks noGrp="1"/>
+          </p:cNvSpPr>
+          <p:nvPr>
+            <p:ph type="title"/>
+          </p:nvPr>
+        </p:nvSpPr>
+        <p:spPr/>
+        <p:txBody>
+          <a:bodyPr/>
+          <a:lstStyle/>
+          <a:p>
+            <a:r>
+              <a:rPr lang="sr-Latn-RS" dirty="0" smtClean="0"/>
+              <a:t>Dostupnost (</a:t>
+            </a:r>
+            <a:r>
+              <a:rPr lang="sr-Latn-RS" dirty="0" err="1" smtClean="0"/>
+              <a:t>Availability</a:t>
+            </a:r>
+            <a:r>
+              <a:rPr lang="sr-Latn-RS" dirty="0" smtClean="0"/>
+              <a:t>)</a:t>
+            </a:r>
+            <a:endParaRPr lang="en-US" dirty="0"/>
+          </a:p>
+        </p:txBody>
+      </p:sp>
+      <p:sp>
+        <p:nvSpPr>
+          <p:cNvPr id="3" name="Content Placeholder 2"/>
+          <p:cNvSpPr>
+            <a:spLocks noGrp="1"/>
+          </p:cNvSpPr>
+          <p:nvPr>
+            <p:ph idx="1"/>
+          </p:nvPr>
+        </p:nvSpPr>
+        <p:spPr>
+          <a:xfrm>
+            <a:off x="1103313" y="2052918"/>
+            <a:ext cx="7126288" cy="4195481"/>
+          </a:xfrm>
+        </p:spPr>
+        <p:txBody>
+          <a:bodyPr/>
+          <a:lstStyle/>
+          <a:p>
+            <a:r>
+              <a:rPr lang="sr-Latn-RS" dirty="0"/>
+              <a:t>Podaci se automatski distribuiraju među čvorovima </a:t>
+            </a:r>
+            <a:r>
+              <a:rPr lang="sr-Latn-RS" dirty="0" smtClean="0"/>
+              <a:t>klastera</a:t>
+            </a:r>
+          </a:p>
+          <a:p>
+            <a:r>
+              <a:rPr lang="sr-Latn-RS" dirty="0"/>
+              <a:t>Svaki </a:t>
+            </a:r>
+            <a:r>
+              <a:rPr lang="sr-Latn-RS" dirty="0" err="1"/>
+              <a:t>bucket</a:t>
+            </a:r>
+            <a:r>
+              <a:rPr lang="sr-Latn-RS" dirty="0"/>
+              <a:t> se čuva na Data </a:t>
+            </a:r>
+            <a:r>
+              <a:rPr lang="sr-Latn-RS" dirty="0" err="1" smtClean="0"/>
+              <a:t>Service</a:t>
+            </a:r>
+            <a:r>
+              <a:rPr lang="sr-Latn-RS" dirty="0" smtClean="0"/>
+              <a:t> </a:t>
+            </a:r>
+            <a:r>
+              <a:rPr lang="sr-Latn-RS" dirty="0"/>
+              <a:t>čvorovima kao 1024 </a:t>
+            </a:r>
+            <a:r>
+              <a:rPr lang="sr-Latn-RS" dirty="0" err="1"/>
+              <a:t>vBucket</a:t>
+            </a:r>
+            <a:r>
+              <a:rPr lang="sr-Latn-RS" dirty="0"/>
+              <a:t> (</a:t>
+            </a:r>
+            <a:r>
+              <a:rPr lang="sr-Latn-RS" dirty="0" err="1"/>
+              <a:t>virutal</a:t>
+            </a:r>
+            <a:r>
+              <a:rPr lang="sr-Latn-RS" dirty="0"/>
+              <a:t> </a:t>
+            </a:r>
+            <a:r>
+              <a:rPr lang="sr-Latn-RS" dirty="0" err="1"/>
+              <a:t>bucket</a:t>
+            </a:r>
+            <a:r>
+              <a:rPr lang="sr-Latn-RS" dirty="0" smtClean="0"/>
+              <a:t>)</a:t>
+            </a:r>
+          </a:p>
+          <a:p>
+            <a:r>
+              <a:rPr lang="sr-Latn-RS" dirty="0" smtClean="0"/>
+              <a:t>Couchbase podržava dve vrste replikacije:</a:t>
+            </a:r>
+          </a:p>
+          <a:p>
+            <a:pPr lvl="1"/>
+            <a:r>
+              <a:rPr lang="sr-Latn-RS" dirty="0"/>
+              <a:t>Lokalna (</a:t>
+            </a:r>
+            <a:r>
+              <a:rPr lang="sr-Latn-RS" dirty="0" err="1"/>
+              <a:t>Local</a:t>
+            </a:r>
+            <a:r>
+              <a:rPr lang="sr-Latn-RS" dirty="0"/>
+              <a:t>) ili replikacija unutar klastera uključuje </a:t>
+            </a:r>
+            <a:r>
+              <a:rPr lang="sr-Latn-RS" dirty="0" err="1"/>
+              <a:t>repliciranje</a:t>
+            </a:r>
+            <a:r>
+              <a:rPr lang="sr-Latn-RS" dirty="0"/>
+              <a:t> podataka između čvorova </a:t>
+            </a:r>
+            <a:r>
+              <a:rPr lang="sr-Latn-RS" dirty="0" smtClean="0"/>
+              <a:t>klastera</a:t>
+            </a:r>
+          </a:p>
+          <a:p>
+            <a:pPr lvl="1"/>
+            <a:r>
+              <a:rPr lang="sr-Latn-RS" dirty="0"/>
+              <a:t>Udaljena (</a:t>
+            </a:r>
+            <a:r>
+              <a:rPr lang="sr-Latn-RS" dirty="0" err="1"/>
+              <a:t>Remote</a:t>
+            </a:r>
+            <a:r>
+              <a:rPr lang="sr-Latn-RS" dirty="0"/>
+              <a:t>) ili replikacija između Data centara (</a:t>
+            </a:r>
+            <a:r>
+              <a:rPr lang="sr-Latn-RS" dirty="0" err="1"/>
+              <a:t>Cross</a:t>
+            </a:r>
+            <a:r>
+              <a:rPr lang="sr-Latn-RS" dirty="0"/>
+              <a:t> Data </a:t>
+            </a:r>
+            <a:r>
+              <a:rPr lang="sr-Latn-RS" dirty="0" err="1"/>
+              <a:t>Center</a:t>
+            </a:r>
+            <a:r>
+              <a:rPr lang="sr-Latn-RS" dirty="0"/>
+              <a:t> </a:t>
+            </a:r>
+            <a:r>
+              <a:rPr lang="sr-Latn-RS" dirty="0" err="1"/>
+              <a:t>Replication</a:t>
+            </a:r>
+            <a:r>
+              <a:rPr lang="sr-Latn-RS" dirty="0"/>
+              <a:t> – XDCR) podrazumeva razmenu podataka između različitih klastera</a:t>
+            </a:r>
+            <a:endParaRPr lang="en-US" dirty="0"/>
+          </a:p>
+        </p:txBody>
+      </p:sp>
+      <p:pic>
+        <p:nvPicPr>
+          <p:cNvPr id="4" name="Picture 3"/>
+          <p:cNvPicPr>
+            <a:picLocks noChangeAspect="1"/>
+          </p:cNvPicPr>
+          <p:nvPr/>
+        </p:nvPicPr>
+        <p:blipFill>
+          <a:blip r:embed="rId2" cstate="print">
+            <a:extLst>
+              <a:ext uri="{28A0092B-C50C-407E-A947-70E740481C1C}">
+                <a14:useLocalDpi xmlns:a14="http://schemas.microsoft.com/office/drawing/2010/main" val="0"/>
+              </a:ext>
+            </a:extLst>
+          </a:blip>
+          <a:stretch>
+            <a:fillRect/>
+          </a:stretch>
+        </p:blipFill>
+        <p:spPr>
+          <a:xfrm>
+            <a:off x="8085051" y="3585126"/>
+            <a:ext cx="3931566" cy="2841171"/>
+          </a:xfrm>
+          <a:prstGeom prst="rect">
+            <a:avLst/>
+          </a:prstGeom>
+        </p:spPr>
+      </p:pic>
+    </p:spTree>
+    <p:extLst>
+      <p:ext uri="{BB962C8B-B14F-4D97-AF65-F5344CB8AC3E}">
+        <p14:creationId xmlns:p14="http://schemas.microsoft.com/office/powerpoint/2010/main" val="3747525301"/>
+      </p:ext>
+    </p:extLst>
+  </p:cSld>
+  <p:clrMapOvr>
+    <a:masterClrMapping/>
+  </p:clrMapOvr>
+</p:sld>
+</file>
+
+<file path=ppt/slides/slide17.xml><?xml version="1.0" encoding="utf-8"?>
+<p:sld xmlns:a="http://schemas.openxmlformats.org/drawingml/2006/main" xmlns:r="http://schemas.openxmlformats.org/officeDocument/2006/relationships" xmlns:p="http://schemas.openxmlformats.org/presentationml/2006/main">
+  <p:cSld>
+    <p:spTree>
+      <p:nvGrpSpPr>
+        <p:cNvPr id="1" name=""/>
+        <p:cNvGrpSpPr/>
+        <p:nvPr/>
+      </p:nvGrpSpPr>
+      <p:grpSpPr>
+        <a:xfrm>
+          <a:off x="0" y="0"/>
+          <a:ext cx="0" cy="0"/>
+          <a:chOff x="0" y="0"/>
+          <a:chExt cx="0" cy="0"/>
+        </a:xfrm>
+      </p:grpSpPr>
+      <p:sp>
+        <p:nvSpPr>
+          <p:cNvPr id="2" name="Title 1"/>
+          <p:cNvSpPr>
+            <a:spLocks noGrp="1"/>
+          </p:cNvSpPr>
+          <p:nvPr>
+            <p:ph type="title"/>
+          </p:nvPr>
+        </p:nvSpPr>
+        <p:spPr/>
+        <p:txBody>
+          <a:bodyPr/>
+          <a:lstStyle/>
+          <a:p>
+            <a:r>
+              <a:rPr lang="sr-Latn-RS" dirty="0" smtClean="0"/>
+              <a:t>Primer</a:t>
+            </a:r>
+            <a:endParaRPr lang="en-US" dirty="0"/>
+          </a:p>
+        </p:txBody>
+      </p:sp>
+      <p:pic>
+        <p:nvPicPr>
+          <p:cNvPr id="2050" name="Picture 2" descr="Untitled3"/>
+          <p:cNvPicPr>
+            <a:picLocks noChangeAspect="1" noChangeArrowheads="1"/>
+          </p:cNvPicPr>
+          <p:nvPr/>
+        </p:nvPicPr>
+        <p:blipFill>
+          <a:blip r:embed="rId2">
+            <a:extLst>
+              <a:ext uri="{28A0092B-C50C-407E-A947-70E740481C1C}">
+                <a14:useLocalDpi xmlns:a14="http://schemas.microsoft.com/office/drawing/2010/main" val="0"/>
+              </a:ext>
+            </a:extLst>
+          </a:blip>
+          <a:srcRect/>
+          <a:stretch>
+            <a:fillRect/>
+          </a:stretch>
+        </p:blipFill>
+        <p:spPr bwMode="auto">
+          <a:xfrm>
+            <a:off x="7043737" y="570980"/>
+            <a:ext cx="4339485" cy="5944120"/>
+          </a:xfrm>
+          <a:prstGeom prst="rect">
+            <a:avLst/>
+          </a:prstGeom>
+          <a:noFill/>
+          <a:ln>
+            <a:noFill/>
+          </a:ln>
+          <a:extLst>
+            <a:ext uri="{909E8E84-426E-40DD-AFC4-6F175D3DCCD1}">
+              <a14:hiddenFill xmlns:a14="http://schemas.microsoft.com/office/drawing/2010/main">
+                <a:solidFill>
+                  <a:srgbClr val="FFFFFF"/>
+                </a:solidFill>
+              </a14:hiddenFill>
+            </a:ext>
+            <a:ext uri="{91240B29-F687-4F45-9708-019B960494DF}">
+              <a14:hiddenLine xmlns:a14="http://schemas.microsoft.com/office/drawing/2010/main" w="9525">
+                <a:solidFill>
+                  <a:srgbClr val="000000"/>
+                </a:solidFill>
+                <a:miter lim="800000"/>
+                <a:headEnd/>
+                <a:tailEnd/>
+              </a14:hiddenLine>
+            </a:ext>
+          </a:extLst>
+        </p:spPr>
+      </p:pic>
+      <p:pic>
+        <p:nvPicPr>
+          <p:cNvPr id="2051" name="Picture 3" descr="Untitled9"/>
+          <p:cNvPicPr>
+            <a:picLocks noChangeAspect="1" noChangeArrowheads="1"/>
+          </p:cNvPicPr>
+          <p:nvPr/>
+        </p:nvPicPr>
+        <p:blipFill>
+          <a:blip r:embed="rId3" cstate="print">
+            <a:extLst>
+              <a:ext uri="{28A0092B-C50C-407E-A947-70E740481C1C}">
+                <a14:useLocalDpi xmlns:a14="http://schemas.microsoft.com/office/drawing/2010/main" val="0"/>
+              </a:ext>
+            </a:extLst>
+          </a:blip>
+          <a:srcRect l="-128" b="25940"/>
+          <a:stretch>
+            <a:fillRect/>
+          </a:stretch>
+        </p:blipFill>
+        <p:spPr bwMode="auto">
+          <a:xfrm>
+            <a:off x="646111" y="1924739"/>
+            <a:ext cx="5940425" cy="2339975"/>
+          </a:xfrm>
+          <a:prstGeom prst="rect">
+            <a:avLst/>
+          </a:prstGeom>
+          <a:noFill/>
+          <a:ln>
+            <a:noFill/>
+          </a:ln>
+          <a:extLst>
+            <a:ext uri="{909E8E84-426E-40DD-AFC4-6F175D3DCCD1}">
+              <a14:hiddenFill xmlns:a14="http://schemas.microsoft.com/office/drawing/2010/main">
+                <a:solidFill>
+                  <a:srgbClr val="FFFFFF"/>
+                </a:solidFill>
+              </a14:hiddenFill>
+            </a:ext>
+            <a:ext uri="{91240B29-F687-4F45-9708-019B960494DF}">
+              <a14:hiddenLine xmlns:a14="http://schemas.microsoft.com/office/drawing/2010/main" w="9525">
+                <a:solidFill>
+                  <a:srgbClr val="000000"/>
+                </a:solidFill>
+                <a:miter lim="800000"/>
+                <a:headEnd/>
+                <a:tailEnd/>
+              </a14:hiddenLine>
+            </a:ext>
+          </a:extLst>
+        </p:spPr>
+      </p:pic>
+    </p:spTree>
+    <p:extLst>
+      <p:ext uri="{BB962C8B-B14F-4D97-AF65-F5344CB8AC3E}">
+        <p14:creationId xmlns:p14="http://schemas.microsoft.com/office/powerpoint/2010/main" val="455660314"/>
+      </p:ext>
+    </p:extLst>
+  </p:cSld>
+  <p:clrMapOvr>
+    <a:masterClrMapping/>
+  </p:clrMapOvr>
+</p:sld>
+</file>
+
+<file path=ppt/slides/slide18.xml><?xml version="1.0" encoding="utf-8"?>
+<p:sld xmlns:a="http://schemas.openxmlformats.org/drawingml/2006/main" xmlns:r="http://schemas.openxmlformats.org/officeDocument/2006/relationships" xmlns:p="http://schemas.openxmlformats.org/presentationml/2006/main">
+  <p:cSld>
+    <p:spTree>
+      <p:nvGrpSpPr>
+        <p:cNvPr id="1" name=""/>
+        <p:cNvGrpSpPr/>
+        <p:nvPr/>
+      </p:nvGrpSpPr>
+      <p:grpSpPr>
+        <a:xfrm>
+          <a:off x="0" y="0"/>
+          <a:ext cx="0" cy="0"/>
+          <a:chOff x="0" y="0"/>
+          <a:chExt cx="0" cy="0"/>
+        </a:xfrm>
+      </p:grpSpPr>
+      <p:sp>
+        <p:nvSpPr>
+          <p:cNvPr id="2" name="Title 1"/>
+          <p:cNvSpPr>
+            <a:spLocks noGrp="1"/>
+          </p:cNvSpPr>
+          <p:nvPr>
+            <p:ph type="title"/>
+          </p:nvPr>
+        </p:nvSpPr>
+        <p:spPr/>
+        <p:txBody>
+          <a:bodyPr/>
+          <a:lstStyle/>
+          <a:p>
+            <a:r>
+              <a:rPr lang="sr-Latn-RS" dirty="0" smtClean="0"/>
+              <a:t>Primer Java </a:t>
+            </a:r>
+            <a:r>
+              <a:rPr lang="sr-Latn-RS" dirty="0" err="1" smtClean="0"/>
+              <a:t>App</a:t>
+            </a:r>
+            <a:endParaRPr lang="en-US" dirty="0"/>
+          </a:p>
+        </p:txBody>
+      </p:sp>
+      <p:pic>
+        <p:nvPicPr>
+          <p:cNvPr id="3074" name="Picture 2" descr="Untitled5"/>
+          <p:cNvPicPr>
+            <a:picLocks noChangeAspect="1" noChangeArrowheads="1"/>
+          </p:cNvPicPr>
+          <p:nvPr/>
+        </p:nvPicPr>
+        <p:blipFill>
+          <a:blip r:embed="rId2">
+            <a:extLst>
+              <a:ext uri="{28A0092B-C50C-407E-A947-70E740481C1C}">
+                <a14:useLocalDpi xmlns:a14="http://schemas.microsoft.com/office/drawing/2010/main" val="0"/>
+              </a:ext>
+            </a:extLst>
+          </a:blip>
+          <a:srcRect/>
+          <a:stretch>
+            <a:fillRect/>
+          </a:stretch>
+        </p:blipFill>
+        <p:spPr bwMode="auto">
+          <a:xfrm>
+            <a:off x="218621" y="2602593"/>
+            <a:ext cx="5940425" cy="2530475"/>
+          </a:xfrm>
+          <a:prstGeom prst="rect">
+            <a:avLst/>
+          </a:prstGeom>
+          <a:noFill/>
+          <a:ln>
+            <a:noFill/>
+          </a:ln>
+          <a:extLst>
+            <a:ext uri="{909E8E84-426E-40DD-AFC4-6F175D3DCCD1}">
+              <a14:hiddenFill xmlns:a14="http://schemas.microsoft.com/office/drawing/2010/main">
+                <a:solidFill>
+                  <a:srgbClr val="FFFFFF"/>
+                </a:solidFill>
+              </a14:hiddenFill>
+            </a:ext>
+            <a:ext uri="{91240B29-F687-4F45-9708-019B960494DF}">
+              <a14:hiddenLine xmlns:a14="http://schemas.microsoft.com/office/drawing/2010/main" w="9525">
+                <a:solidFill>
+                  <a:srgbClr val="000000"/>
+                </a:solidFill>
+                <a:miter lim="800000"/>
+                <a:headEnd/>
+                <a:tailEnd/>
+              </a14:hiddenLine>
+            </a:ext>
+          </a:extLst>
+        </p:spPr>
+      </p:pic>
+      <p:pic>
+        <p:nvPicPr>
+          <p:cNvPr id="3075" name="Picture 3" descr="Untitled6"/>
+          <p:cNvPicPr>
+            <a:picLocks noChangeAspect="1" noChangeArrowheads="1"/>
+          </p:cNvPicPr>
+          <p:nvPr/>
+        </p:nvPicPr>
+        <p:blipFill>
+          <a:blip r:embed="rId3">
+            <a:extLst>
+              <a:ext uri="{28A0092B-C50C-407E-A947-70E740481C1C}">
+                <a14:useLocalDpi xmlns:a14="http://schemas.microsoft.com/office/drawing/2010/main" val="0"/>
+              </a:ext>
+            </a:extLst>
+          </a:blip>
+          <a:srcRect/>
+          <a:stretch>
+            <a:fillRect/>
+          </a:stretch>
+        </p:blipFill>
+        <p:spPr bwMode="auto">
+          <a:xfrm>
+            <a:off x="6253162" y="1298801"/>
+            <a:ext cx="5938838" cy="5516563"/>
+          </a:xfrm>
+          <a:prstGeom prst="rect">
+            <a:avLst/>
+          </a:prstGeom>
+          <a:noFill/>
+          <a:ln>
+            <a:noFill/>
+          </a:ln>
+          <a:extLst>
+            <a:ext uri="{909E8E84-426E-40DD-AFC4-6F175D3DCCD1}">
+              <a14:hiddenFill xmlns:a14="http://schemas.microsoft.com/office/drawing/2010/main">
+                <a:solidFill>
+                  <a:srgbClr val="FFFFFF"/>
+                </a:solidFill>
+              </a14:hiddenFill>
+            </a:ext>
+            <a:ext uri="{91240B29-F687-4F45-9708-019B960494DF}">
+              <a14:hiddenLine xmlns:a14="http://schemas.microsoft.com/office/drawing/2010/main" w="9525">
+                <a:solidFill>
+                  <a:srgbClr val="000000"/>
+                </a:solidFill>
+                <a:miter lim="800000"/>
+                <a:headEnd/>
+                <a:tailEnd/>
+              </a14:hiddenLine>
+            </a:ext>
+          </a:extLst>
+        </p:spPr>
+      </p:pic>
+    </p:spTree>
+    <p:extLst>
+      <p:ext uri="{BB962C8B-B14F-4D97-AF65-F5344CB8AC3E}">
+        <p14:creationId xmlns:p14="http://schemas.microsoft.com/office/powerpoint/2010/main" val="2823237250"/>
+      </p:ext>
+    </p:extLst>
+  </p:cSld>
+  <p:clrMapOvr>
+    <a:masterClrMapping/>
+  </p:clrMapOvr>
+</p:sld>
+</file>
+
+<file path=ppt/slides/slide19.xml><?xml version="1.0" encoding="utf-8"?>
+<p:sld xmlns:a="http://schemas.openxmlformats.org/drawingml/2006/main" xmlns:r="http://schemas.openxmlformats.org/officeDocument/2006/relationships" xmlns:p="http://schemas.openxmlformats.org/presentationml/2006/main">
+  <p:cSld>
+    <p:spTree>
+      <p:nvGrpSpPr>
+        <p:cNvPr id="1" name=""/>
+        <p:cNvGrpSpPr/>
+        <p:nvPr/>
+      </p:nvGrpSpPr>
+      <p:grpSpPr>
+        <a:xfrm>
+          <a:off x="0" y="0"/>
+          <a:ext cx="0" cy="0"/>
+          <a:chOff x="0" y="0"/>
+          <a:chExt cx="0" cy="0"/>
+        </a:xfrm>
+      </p:grpSpPr>
+      <p:sp>
+        <p:nvSpPr>
+          <p:cNvPr id="2" name="Title 1"/>
+          <p:cNvSpPr>
+            <a:spLocks noGrp="1"/>
+          </p:cNvSpPr>
+          <p:nvPr>
+            <p:ph type="title"/>
+          </p:nvPr>
+        </p:nvSpPr>
+        <p:spPr>
+          <a:xfrm>
+            <a:off x="646111" y="452718"/>
+            <a:ext cx="6489475" cy="1400530"/>
+          </a:xfrm>
+        </p:spPr>
+        <p:txBody>
+          <a:bodyPr/>
+          <a:lstStyle/>
+          <a:p>
+            <a:r>
+              <a:rPr lang="sr-Latn-RS" dirty="0" smtClean="0"/>
+              <a:t>Primer – Transakcija i regularni upis</a:t>
+            </a:r>
+            <a:endParaRPr lang="en-US" dirty="0"/>
+          </a:p>
+        </p:txBody>
+      </p:sp>
+      <p:pic>
+        <p:nvPicPr>
+          <p:cNvPr id="4098" name="Picture 2" descr="Untitled2"/>
+          <p:cNvPicPr>
+            <a:picLocks noChangeAspect="1" noChangeArrowheads="1"/>
+          </p:cNvPicPr>
+          <p:nvPr/>
+        </p:nvPicPr>
+        <p:blipFill>
+          <a:blip r:embed="rId2">
+            <a:extLst>
+              <a:ext uri="{28A0092B-C50C-407E-A947-70E740481C1C}">
+                <a14:useLocalDpi xmlns:a14="http://schemas.microsoft.com/office/drawing/2010/main" val="0"/>
+              </a:ext>
+            </a:extLst>
+          </a:blip>
+          <a:srcRect/>
+          <a:stretch>
+            <a:fillRect/>
+          </a:stretch>
+        </p:blipFill>
+        <p:spPr bwMode="auto">
+          <a:xfrm>
+            <a:off x="7266215" y="452718"/>
+            <a:ext cx="4498974" cy="6352102"/>
+          </a:xfrm>
+          <a:prstGeom prst="rect">
+            <a:avLst/>
+          </a:prstGeom>
+          <a:noFill/>
+          <a:ln>
+            <a:noFill/>
+          </a:ln>
+          <a:extLst>
+            <a:ext uri="{909E8E84-426E-40DD-AFC4-6F175D3DCCD1}">
+              <a14:hiddenFill xmlns:a14="http://schemas.microsoft.com/office/drawing/2010/main">
+                <a:solidFill>
+                  <a:srgbClr val="FFFFFF"/>
+                </a:solidFill>
+              </a14:hiddenFill>
+            </a:ext>
+            <a:ext uri="{91240B29-F687-4F45-9708-019B960494DF}">
+              <a14:hiddenLine xmlns:a14="http://schemas.microsoft.com/office/drawing/2010/main" w="9525">
+                <a:solidFill>
+                  <a:srgbClr val="000000"/>
+                </a:solidFill>
+                <a:miter lim="800000"/>
+                <a:headEnd/>
+                <a:tailEnd/>
+              </a14:hiddenLine>
+            </a:ext>
+          </a:extLst>
+        </p:spPr>
+      </p:pic>
+      <p:pic>
+        <p:nvPicPr>
+          <p:cNvPr id="4099" name="Picture 3" descr="Untitled4"/>
+          <p:cNvPicPr>
+            <a:picLocks noChangeAspect="1" noChangeArrowheads="1"/>
+          </p:cNvPicPr>
+          <p:nvPr/>
+        </p:nvPicPr>
+        <p:blipFill>
+          <a:blip r:embed="rId3">
+            <a:extLst>
+              <a:ext uri="{28A0092B-C50C-407E-A947-70E740481C1C}">
+                <a14:useLocalDpi xmlns:a14="http://schemas.microsoft.com/office/drawing/2010/main" val="0"/>
+              </a:ext>
+            </a:extLst>
+          </a:blip>
+          <a:srcRect/>
+          <a:stretch>
+            <a:fillRect/>
+          </a:stretch>
+        </p:blipFill>
+        <p:spPr bwMode="auto">
+          <a:xfrm>
+            <a:off x="646111" y="2160135"/>
+            <a:ext cx="5940425" cy="4008437"/>
+          </a:xfrm>
+          <a:prstGeom prst="rect">
+            <a:avLst/>
+          </a:prstGeom>
+          <a:noFill/>
+          <a:ln>
+            <a:noFill/>
+          </a:ln>
+          <a:extLst>
+            <a:ext uri="{909E8E84-426E-40DD-AFC4-6F175D3DCCD1}">
+              <a14:hiddenFill xmlns:a14="http://schemas.microsoft.com/office/drawing/2010/main">
+                <a:solidFill>
+                  <a:srgbClr val="FFFFFF"/>
+                </a:solidFill>
+              </a14:hiddenFill>
+            </a:ext>
+            <a:ext uri="{91240B29-F687-4F45-9708-019B960494DF}">
+              <a14:hiddenLine xmlns:a14="http://schemas.microsoft.com/office/drawing/2010/main" w="9525">
+                <a:solidFill>
+                  <a:srgbClr val="000000"/>
+                </a:solidFill>
+                <a:miter lim="800000"/>
+                <a:headEnd/>
+                <a:tailEnd/>
+              </a14:hiddenLine>
+            </a:ext>
+          </a:extLst>
+        </p:spPr>
+      </p:pic>
+    </p:spTree>
+    <p:extLst>
+      <p:ext uri="{BB962C8B-B14F-4D97-AF65-F5344CB8AC3E}">
+        <p14:creationId xmlns:p14="http://schemas.microsoft.com/office/powerpoint/2010/main" val="3437074123"/>
+      </p:ext>
+    </p:extLst>
+  </p:cSld>
+  <p:clrMapOvr>
+    <a:masterClrMapping/>
+  </p:clrMapOvr>
 </p:sld>
 </file>
 
@@ -6450,6 +8153,278 @@
       </p:par>
     </p:tnLst>
   </p:timing>
+</p:sld>
+</file>
+
+<file path=ppt/slides/slide20.xml><?xml version="1.0" encoding="utf-8"?>
+<p:sld xmlns:a="http://schemas.openxmlformats.org/drawingml/2006/main" xmlns:r="http://schemas.openxmlformats.org/officeDocument/2006/relationships" xmlns:p="http://schemas.openxmlformats.org/presentationml/2006/main">
+  <p:cSld>
+    <p:spTree>
+      <p:nvGrpSpPr>
+        <p:cNvPr id="1" name=""/>
+        <p:cNvGrpSpPr/>
+        <p:nvPr/>
+      </p:nvGrpSpPr>
+      <p:grpSpPr>
+        <a:xfrm>
+          <a:off x="0" y="0"/>
+          <a:ext cx="0" cy="0"/>
+          <a:chOff x="0" y="0"/>
+          <a:chExt cx="0" cy="0"/>
+        </a:xfrm>
+      </p:grpSpPr>
+      <p:sp>
+        <p:nvSpPr>
+          <p:cNvPr id="2" name="Title 1"/>
+          <p:cNvSpPr>
+            <a:spLocks noGrp="1"/>
+          </p:cNvSpPr>
+          <p:nvPr>
+            <p:ph type="title"/>
+          </p:nvPr>
+        </p:nvSpPr>
+        <p:spPr/>
+        <p:txBody>
+          <a:bodyPr/>
+          <a:lstStyle/>
+          <a:p>
+            <a:r>
+              <a:rPr lang="sr-Latn-RS" dirty="0"/>
+              <a:t>Primer – Transakcija i regularni upis</a:t>
+            </a:r>
+            <a:endParaRPr lang="en-US" dirty="0"/>
+          </a:p>
+        </p:txBody>
+      </p:sp>
+      <p:pic>
+        <p:nvPicPr>
+          <p:cNvPr id="5122" name="Picture 2" descr="Untitled"/>
+          <p:cNvPicPr>
+            <a:picLocks noChangeAspect="1" noChangeArrowheads="1"/>
+          </p:cNvPicPr>
+          <p:nvPr/>
+        </p:nvPicPr>
+        <p:blipFill>
+          <a:blip r:embed="rId2">
+            <a:extLst>
+              <a:ext uri="{28A0092B-C50C-407E-A947-70E740481C1C}">
+                <a14:useLocalDpi xmlns:a14="http://schemas.microsoft.com/office/drawing/2010/main" val="0"/>
+              </a:ext>
+            </a:extLst>
+          </a:blip>
+          <a:srcRect/>
+          <a:stretch>
+            <a:fillRect/>
+          </a:stretch>
+        </p:blipFill>
+        <p:spPr bwMode="auto">
+          <a:xfrm>
+            <a:off x="1563418" y="1497021"/>
+            <a:ext cx="7570107" cy="5360979"/>
+          </a:xfrm>
+          <a:prstGeom prst="rect">
+            <a:avLst/>
+          </a:prstGeom>
+          <a:noFill/>
+          <a:ln>
+            <a:noFill/>
+          </a:ln>
+          <a:extLst>
+            <a:ext uri="{909E8E84-426E-40DD-AFC4-6F175D3DCCD1}">
+              <a14:hiddenFill xmlns:a14="http://schemas.microsoft.com/office/drawing/2010/main">
+                <a:solidFill>
+                  <a:srgbClr val="FFFFFF"/>
+                </a:solidFill>
+              </a14:hiddenFill>
+            </a:ext>
+            <a:ext uri="{91240B29-F687-4F45-9708-019B960494DF}">
+              <a14:hiddenLine xmlns:a14="http://schemas.microsoft.com/office/drawing/2010/main" w="9525">
+                <a:solidFill>
+                  <a:srgbClr val="000000"/>
+                </a:solidFill>
+                <a:miter lim="800000"/>
+                <a:headEnd/>
+                <a:tailEnd/>
+              </a14:hiddenLine>
+            </a:ext>
+          </a:extLst>
+        </p:spPr>
+      </p:pic>
+    </p:spTree>
+    <p:extLst>
+      <p:ext uri="{BB962C8B-B14F-4D97-AF65-F5344CB8AC3E}">
+        <p14:creationId xmlns:p14="http://schemas.microsoft.com/office/powerpoint/2010/main" val="3253521857"/>
+      </p:ext>
+    </p:extLst>
+  </p:cSld>
+  <p:clrMapOvr>
+    <a:masterClrMapping/>
+  </p:clrMapOvr>
+</p:sld>
+</file>
+
+<file path=ppt/slides/slide21.xml><?xml version="1.0" encoding="utf-8"?>
+<p:sld xmlns:a="http://schemas.openxmlformats.org/drawingml/2006/main" xmlns:r="http://schemas.openxmlformats.org/officeDocument/2006/relationships" xmlns:p="http://schemas.openxmlformats.org/presentationml/2006/main">
+  <p:cSld>
+    <p:spTree>
+      <p:nvGrpSpPr>
+        <p:cNvPr id="1" name=""/>
+        <p:cNvGrpSpPr/>
+        <p:nvPr/>
+      </p:nvGrpSpPr>
+      <p:grpSpPr>
+        <a:xfrm>
+          <a:off x="0" y="0"/>
+          <a:ext cx="0" cy="0"/>
+          <a:chOff x="0" y="0"/>
+          <a:chExt cx="0" cy="0"/>
+        </a:xfrm>
+      </p:grpSpPr>
+      <p:sp>
+        <p:nvSpPr>
+          <p:cNvPr id="2" name="Title 1"/>
+          <p:cNvSpPr>
+            <a:spLocks noGrp="1"/>
+          </p:cNvSpPr>
+          <p:nvPr>
+            <p:ph type="title"/>
+          </p:nvPr>
+        </p:nvSpPr>
+        <p:spPr/>
+        <p:txBody>
+          <a:bodyPr/>
+          <a:lstStyle/>
+          <a:p>
+            <a:r>
+              <a:rPr lang="sr-Latn-RS" dirty="0" smtClean="0"/>
+              <a:t>Primer – Dva klijenta sa konkurentnim transakcijama</a:t>
+            </a:r>
+            <a:endParaRPr lang="en-US" dirty="0"/>
+          </a:p>
+        </p:txBody>
+      </p:sp>
+      <p:pic>
+        <p:nvPicPr>
+          <p:cNvPr id="6146" name="Picture 2" descr="Untitled8"/>
+          <p:cNvPicPr>
+            <a:picLocks noChangeAspect="1" noChangeArrowheads="1"/>
+          </p:cNvPicPr>
+          <p:nvPr/>
+        </p:nvPicPr>
+        <p:blipFill>
+          <a:blip r:embed="rId2">
+            <a:extLst>
+              <a:ext uri="{28A0092B-C50C-407E-A947-70E740481C1C}">
+                <a14:useLocalDpi xmlns:a14="http://schemas.microsoft.com/office/drawing/2010/main" val="0"/>
+              </a:ext>
+            </a:extLst>
+          </a:blip>
+          <a:srcRect/>
+          <a:stretch>
+            <a:fillRect/>
+          </a:stretch>
+        </p:blipFill>
+        <p:spPr bwMode="auto">
+          <a:xfrm>
+            <a:off x="646111" y="1979039"/>
+            <a:ext cx="8404451" cy="4587316"/>
+          </a:xfrm>
+          <a:prstGeom prst="rect">
+            <a:avLst/>
+          </a:prstGeom>
+          <a:noFill/>
+          <a:ln>
+            <a:noFill/>
+          </a:ln>
+          <a:extLst>
+            <a:ext uri="{909E8E84-426E-40DD-AFC4-6F175D3DCCD1}">
+              <a14:hiddenFill xmlns:a14="http://schemas.microsoft.com/office/drawing/2010/main">
+                <a:solidFill>
+                  <a:srgbClr val="FFFFFF"/>
+                </a:solidFill>
+              </a14:hiddenFill>
+            </a:ext>
+            <a:ext uri="{91240B29-F687-4F45-9708-019B960494DF}">
+              <a14:hiddenLine xmlns:a14="http://schemas.microsoft.com/office/drawing/2010/main" w="9525">
+                <a:solidFill>
+                  <a:srgbClr val="000000"/>
+                </a:solidFill>
+                <a:miter lim="800000"/>
+                <a:headEnd/>
+                <a:tailEnd/>
+              </a14:hiddenLine>
+            </a:ext>
+          </a:extLst>
+        </p:spPr>
+      </p:pic>
+    </p:spTree>
+    <p:extLst>
+      <p:ext uri="{BB962C8B-B14F-4D97-AF65-F5344CB8AC3E}">
+        <p14:creationId xmlns:p14="http://schemas.microsoft.com/office/powerpoint/2010/main" val="769877466"/>
+      </p:ext>
+    </p:extLst>
+  </p:cSld>
+  <p:clrMapOvr>
+    <a:masterClrMapping/>
+  </p:clrMapOvr>
+</p:sld>
+</file>
+
+<file path=ppt/slides/slide22.xml><?xml version="1.0" encoding="utf-8"?>
+<p:sld xmlns:a="http://schemas.openxmlformats.org/drawingml/2006/main" xmlns:r="http://schemas.openxmlformats.org/officeDocument/2006/relationships" xmlns:p="http://schemas.openxmlformats.org/presentationml/2006/main">
+  <p:cSld>
+    <p:spTree>
+      <p:nvGrpSpPr>
+        <p:cNvPr id="1" name=""/>
+        <p:cNvGrpSpPr/>
+        <p:nvPr/>
+      </p:nvGrpSpPr>
+      <p:grpSpPr>
+        <a:xfrm>
+          <a:off x="0" y="0"/>
+          <a:ext cx="0" cy="0"/>
+          <a:chOff x="0" y="0"/>
+          <a:chExt cx="0" cy="0"/>
+        </a:xfrm>
+      </p:grpSpPr>
+      <p:sp>
+        <p:nvSpPr>
+          <p:cNvPr id="2" name="Title 1"/>
+          <p:cNvSpPr>
+            <a:spLocks noGrp="1"/>
+          </p:cNvSpPr>
+          <p:nvPr>
+            <p:ph type="title"/>
+          </p:nvPr>
+        </p:nvSpPr>
+        <p:spPr>
+          <a:xfrm>
+            <a:off x="1707468" y="2706062"/>
+            <a:ext cx="9404723" cy="1400530"/>
+          </a:xfrm>
+        </p:spPr>
+        <p:txBody>
+          <a:bodyPr/>
+          <a:lstStyle/>
+          <a:p>
+            <a:r>
+              <a:rPr lang="sr-Latn-RS" sz="7200" dirty="0" smtClean="0"/>
+              <a:t>Hvala na pažnji</a:t>
+            </a:r>
+            <a:endParaRPr lang="en-US" sz="7200" dirty="0"/>
+          </a:p>
+        </p:txBody>
+      </p:sp>
+    </p:spTree>
+    <p:extLst>
+      <p:ext uri="{BB962C8B-B14F-4D97-AF65-F5344CB8AC3E}">
+        <p14:creationId xmlns:p14="http://schemas.microsoft.com/office/powerpoint/2010/main" val="480157867"/>
+      </p:ext>
+    </p:extLst>
+  </p:cSld>
+  <p:clrMapOvr>
+    <a:masterClrMapping/>
+  </p:clrMapOvr>
 </p:sld>
 </file>
 

</xml_diff>

<commit_message>
izmene i demo app
</commit_message>
<xml_diff>
--- a/Distribuirane baze/Distribuirane baze podataka.pptx
+++ b/Distribuirane baze/Distribuirane baze podataka.pptx
@@ -8,25 +8,23 @@
     <p:sldId id="256" r:id="rId2"/>
     <p:sldId id="257" r:id="rId3"/>
     <p:sldId id="258" r:id="rId4"/>
-    <p:sldId id="259" r:id="rId5"/>
-    <p:sldId id="260" r:id="rId6"/>
-    <p:sldId id="261" r:id="rId7"/>
-    <p:sldId id="263" r:id="rId8"/>
-    <p:sldId id="262" r:id="rId9"/>
-    <p:sldId id="264" r:id="rId10"/>
-    <p:sldId id="265" r:id="rId11"/>
-    <p:sldId id="266" r:id="rId12"/>
-    <p:sldId id="267" r:id="rId13"/>
-    <p:sldId id="268" r:id="rId14"/>
-    <p:sldId id="269" r:id="rId15"/>
-    <p:sldId id="270" r:id="rId16"/>
-    <p:sldId id="271" r:id="rId17"/>
-    <p:sldId id="272" r:id="rId18"/>
-    <p:sldId id="273" r:id="rId19"/>
-    <p:sldId id="274" r:id="rId20"/>
-    <p:sldId id="275" r:id="rId21"/>
-    <p:sldId id="276" r:id="rId22"/>
-    <p:sldId id="277" r:id="rId23"/>
+    <p:sldId id="260" r:id="rId5"/>
+    <p:sldId id="261" r:id="rId6"/>
+    <p:sldId id="263" r:id="rId7"/>
+    <p:sldId id="262" r:id="rId8"/>
+    <p:sldId id="265" r:id="rId9"/>
+    <p:sldId id="266" r:id="rId10"/>
+    <p:sldId id="267" r:id="rId11"/>
+    <p:sldId id="268" r:id="rId12"/>
+    <p:sldId id="269" r:id="rId13"/>
+    <p:sldId id="270" r:id="rId14"/>
+    <p:sldId id="271" r:id="rId15"/>
+    <p:sldId id="272" r:id="rId16"/>
+    <p:sldId id="273" r:id="rId17"/>
+    <p:sldId id="274" r:id="rId18"/>
+    <p:sldId id="275" r:id="rId19"/>
+    <p:sldId id="276" r:id="rId20"/>
+    <p:sldId id="277" r:id="rId21"/>
   </p:sldIdLst>
   <p:sldSz cx="12192000" cy="6858000"/>
   <p:notesSz cx="6858000" cy="9144000"/>
@@ -319,7 +317,7 @@
           <a:p>
             <a:fld id="{B2C26C56-4076-4554-970D-F37778B03C4F}" type="datetimeFigureOut">
               <a:rPr lang="en-US" smtClean="0"/>
-              <a:t>22/6/2020</a:t>
+              <a:t>25/6/2020</a:t>
             </a:fld>
             <a:endParaRPr lang="en-US"/>
           </a:p>
@@ -594,7 +592,7 @@
           <a:p>
             <a:fld id="{B2C26C56-4076-4554-970D-F37778B03C4F}" type="datetimeFigureOut">
               <a:rPr lang="en-US" smtClean="0"/>
-              <a:t>22/6/2020</a:t>
+              <a:t>25/6/2020</a:t>
             </a:fld>
             <a:endParaRPr lang="en-US"/>
           </a:p>
@@ -788,7 +786,7 @@
           <a:p>
             <a:fld id="{B2C26C56-4076-4554-970D-F37778B03C4F}" type="datetimeFigureOut">
               <a:rPr lang="en-US" smtClean="0"/>
-              <a:t>22/6/2020</a:t>
+              <a:t>25/6/2020</a:t>
             </a:fld>
             <a:endParaRPr lang="en-US"/>
           </a:p>
@@ -1061,7 +1059,7 @@
           <a:p>
             <a:fld id="{B2C26C56-4076-4554-970D-F37778B03C4F}" type="datetimeFigureOut">
               <a:rPr lang="en-US" smtClean="0"/>
-              <a:t>22/6/2020</a:t>
+              <a:t>25/6/2020</a:t>
             </a:fld>
             <a:endParaRPr lang="en-US"/>
           </a:p>
@@ -1402,7 +1400,7 @@
           <a:p>
             <a:fld id="{B2C26C56-4076-4554-970D-F37778B03C4F}" type="datetimeFigureOut">
               <a:rPr lang="en-US" smtClean="0"/>
-              <a:t>22/6/2020</a:t>
+              <a:t>25/6/2020</a:t>
             </a:fld>
             <a:endParaRPr lang="en-US"/>
           </a:p>
@@ -2025,7 +2023,7 @@
           <a:p>
             <a:fld id="{B2C26C56-4076-4554-970D-F37778B03C4F}" type="datetimeFigureOut">
               <a:rPr lang="en-US" smtClean="0"/>
-              <a:t>22/6/2020</a:t>
+              <a:t>25/6/2020</a:t>
             </a:fld>
             <a:endParaRPr lang="en-US"/>
           </a:p>
@@ -2885,7 +2883,7 @@
           <a:p>
             <a:fld id="{B2C26C56-4076-4554-970D-F37778B03C4F}" type="datetimeFigureOut">
               <a:rPr lang="en-US" smtClean="0"/>
-              <a:t>22/6/2020</a:t>
+              <a:t>25/6/2020</a:t>
             </a:fld>
             <a:endParaRPr lang="en-US"/>
           </a:p>
@@ -3055,7 +3053,7 @@
           <a:p>
             <a:fld id="{B2C26C56-4076-4554-970D-F37778B03C4F}" type="datetimeFigureOut">
               <a:rPr lang="en-US" smtClean="0"/>
-              <a:t>22/6/2020</a:t>
+              <a:t>25/6/2020</a:t>
             </a:fld>
             <a:endParaRPr lang="en-US"/>
           </a:p>
@@ -3235,7 +3233,7 @@
           <a:p>
             <a:fld id="{B2C26C56-4076-4554-970D-F37778B03C4F}" type="datetimeFigureOut">
               <a:rPr lang="en-US" smtClean="0"/>
-              <a:t>22/6/2020</a:t>
+              <a:t>25/6/2020</a:t>
             </a:fld>
             <a:endParaRPr lang="en-US"/>
           </a:p>
@@ -3405,7 +3403,7 @@
           <a:p>
             <a:fld id="{B2C26C56-4076-4554-970D-F37778B03C4F}" type="datetimeFigureOut">
               <a:rPr lang="en-US" smtClean="0"/>
-              <a:t>22/6/2020</a:t>
+              <a:t>25/6/2020</a:t>
             </a:fld>
             <a:endParaRPr lang="en-US"/>
           </a:p>
@@ -3652,7 +3650,7 @@
           <a:p>
             <a:fld id="{B2C26C56-4076-4554-970D-F37778B03C4F}" type="datetimeFigureOut">
               <a:rPr lang="en-US" smtClean="0"/>
-              <a:t>22/6/2020</a:t>
+              <a:t>25/6/2020</a:t>
             </a:fld>
             <a:endParaRPr lang="en-US"/>
           </a:p>
@@ -3944,7 +3942,7 @@
           <a:p>
             <a:fld id="{B2C26C56-4076-4554-970D-F37778B03C4F}" type="datetimeFigureOut">
               <a:rPr lang="en-US" smtClean="0"/>
-              <a:t>22/6/2020</a:t>
+              <a:t>25/6/2020</a:t>
             </a:fld>
             <a:endParaRPr lang="en-US"/>
           </a:p>
@@ -4388,7 +4386,7 @@
           <a:p>
             <a:fld id="{B2C26C56-4076-4554-970D-F37778B03C4F}" type="datetimeFigureOut">
               <a:rPr lang="en-US" smtClean="0"/>
-              <a:t>22/6/2020</a:t>
+              <a:t>25/6/2020</a:t>
             </a:fld>
             <a:endParaRPr lang="en-US"/>
           </a:p>
@@ -4506,7 +4504,7 @@
           <a:p>
             <a:fld id="{B2C26C56-4076-4554-970D-F37778B03C4F}" type="datetimeFigureOut">
               <a:rPr lang="en-US" smtClean="0"/>
-              <a:t>22/6/2020</a:t>
+              <a:t>25/6/2020</a:t>
             </a:fld>
             <a:endParaRPr lang="en-US"/>
           </a:p>
@@ -4601,7 +4599,7 @@
           <a:p>
             <a:fld id="{B2C26C56-4076-4554-970D-F37778B03C4F}" type="datetimeFigureOut">
               <a:rPr lang="en-US" smtClean="0"/>
-              <a:t>22/6/2020</a:t>
+              <a:t>25/6/2020</a:t>
             </a:fld>
             <a:endParaRPr lang="en-US"/>
           </a:p>
@@ -4880,7 +4878,7 @@
           <a:p>
             <a:fld id="{B2C26C56-4076-4554-970D-F37778B03C4F}" type="datetimeFigureOut">
               <a:rPr lang="en-US" smtClean="0"/>
-              <a:t>22/6/2020</a:t>
+              <a:t>25/6/2020</a:t>
             </a:fld>
             <a:endParaRPr lang="en-US"/>
           </a:p>
@@ -5155,7 +5153,7 @@
           <a:p>
             <a:fld id="{B2C26C56-4076-4554-970D-F37778B03C4F}" type="datetimeFigureOut">
               <a:rPr lang="en-US" smtClean="0"/>
-              <a:t>22/6/2020</a:t>
+              <a:t>25/6/2020</a:t>
             </a:fld>
             <a:endParaRPr lang="en-US"/>
           </a:p>
@@ -5584,7 +5582,7 @@
           <a:p>
             <a:fld id="{B2C26C56-4076-4554-970D-F37778B03C4F}" type="datetimeFigureOut">
               <a:rPr lang="en-US" smtClean="0"/>
-              <a:t>22/6/2020</a:t>
+              <a:t>25/6/2020</a:t>
             </a:fld>
             <a:endParaRPr lang="en-US"/>
           </a:p>
@@ -6128,76 +6126,36 @@
           <a:lstStyle/>
           <a:p>
             <a:r>
-              <a:rPr lang="en-US" dirty="0"/>
+              <a:rPr lang="sr-Latn-RS" dirty="0" smtClean="0"/>
               <a:t/>
             </a:r>
             <a:br>
-              <a:rPr lang="en-US" dirty="0"/>
+              <a:rPr lang="sr-Latn-RS" dirty="0" smtClean="0"/>
             </a:br>
             <a:r>
-              <a:rPr lang="en-US" sz="6600" b="1" dirty="0" err="1" smtClean="0"/>
-              <a:t>Distribuirane</a:t>
-            </a:r>
-            <a:r>
-              <a:rPr lang="en-US" sz="6600" b="1" dirty="0" smtClean="0"/>
-              <a:t> </a:t>
-            </a:r>
-            <a:r>
-              <a:rPr lang="en-US" sz="6600" b="1" dirty="0" err="1"/>
-              <a:t>baze</a:t>
-            </a:r>
-            <a:r>
-              <a:rPr lang="en-US" sz="6600" b="1" dirty="0"/>
-              <a:t> </a:t>
-            </a:r>
-            <a:r>
-              <a:rPr lang="en-US" sz="6600" b="1" dirty="0" err="1"/>
-              <a:t>podataka</a:t>
-            </a:r>
-            <a:r>
-              <a:rPr lang="en-US" sz="6600" b="1" dirty="0"/>
-              <a:t> </a:t>
-            </a:r>
-            <a:r>
-              <a:rPr lang="en-US" sz="6600" b="1" dirty="0" err="1"/>
-              <a:t>i</a:t>
-            </a:r>
-            <a:r>
-              <a:rPr lang="en-US" sz="6600" b="1" dirty="0"/>
-              <a:t> Couchbase </a:t>
-            </a:r>
-            <a:r>
-              <a:rPr lang="en-US" sz="6600" b="1" dirty="0" err="1"/>
-              <a:t>kao</a:t>
-            </a:r>
-            <a:r>
-              <a:rPr lang="en-US" sz="6600" b="1" dirty="0"/>
-              <a:t> </a:t>
-            </a:r>
-            <a:r>
-              <a:rPr lang="en-US" sz="6600" b="1" dirty="0" smtClean="0"/>
-              <a:t>primer</a:t>
-            </a:r>
-            <a:endParaRPr lang="en-US" sz="6600" dirty="0"/>
-          </a:p>
-        </p:txBody>
-      </p:sp>
-      <p:sp>
-        <p:nvSpPr>
-          <p:cNvPr id="3" name="Subtitle 2"/>
-          <p:cNvSpPr>
-            <a:spLocks noGrp="1"/>
-          </p:cNvSpPr>
-          <p:nvPr>
-            <p:ph type="subTitle" idx="1"/>
-          </p:nvPr>
-        </p:nvSpPr>
-        <p:spPr/>
-        <p:txBody>
-          <a:bodyPr/>
-          <a:lstStyle/>
-          <a:p>
-            <a:endParaRPr lang="en-US" dirty="0"/>
+              <a:rPr lang="sr-Latn-RS" sz="6600" b="1" dirty="0" smtClean="0"/>
+              <a:t>Distribuirane baze podataka i </a:t>
+            </a:r>
+            <a:r>
+              <a:rPr lang="sr-Latn-RS" sz="6600" b="1" dirty="0" smtClean="0">
+                <a:solidFill>
+                  <a:srgbClr val="FF0000"/>
+                </a:solidFill>
+                <a:effectLst>
+                  <a:outerShdw blurRad="38100" dist="38100" dir="2700000" algn="tl">
+                    <a:srgbClr val="000000">
+                      <a:alpha val="43137"/>
+                    </a:srgbClr>
+                  </a:outerShdw>
+                </a:effectLst>
+              </a:rPr>
+              <a:t>Couchbase</a:t>
+            </a:r>
+            <a:r>
+              <a:rPr lang="sr-Latn-RS" sz="6600" b="1" dirty="0" smtClean="0"/>
+              <a:t> kao primer</a:t>
+            </a:r>
+            <a:endParaRPr lang="sr-Latn-RS" sz="6600" dirty="0"/>
           </a:p>
         </p:txBody>
       </p:sp>
@@ -6222,384 +6180,6 @@
 </file>
 
 <file path=ppt/slides/slide10.xml><?xml version="1.0" encoding="utf-8"?>
-<p:sld xmlns:a="http://schemas.openxmlformats.org/drawingml/2006/main" xmlns:r="http://schemas.openxmlformats.org/officeDocument/2006/relationships" xmlns:p="http://schemas.openxmlformats.org/presentationml/2006/main">
-  <p:cSld>
-    <p:spTree>
-      <p:nvGrpSpPr>
-        <p:cNvPr id="1" name=""/>
-        <p:cNvGrpSpPr/>
-        <p:nvPr/>
-      </p:nvGrpSpPr>
-      <p:grpSpPr>
-        <a:xfrm>
-          <a:off x="0" y="0"/>
-          <a:ext cx="0" cy="0"/>
-          <a:chOff x="0" y="0"/>
-          <a:chExt cx="0" cy="0"/>
-        </a:xfrm>
-      </p:grpSpPr>
-      <p:sp>
-        <p:nvSpPr>
-          <p:cNvPr id="2" name="Title 1"/>
-          <p:cNvSpPr>
-            <a:spLocks noGrp="1"/>
-          </p:cNvSpPr>
-          <p:nvPr>
-            <p:ph type="title"/>
-          </p:nvPr>
-        </p:nvSpPr>
-        <p:spPr/>
-        <p:txBody>
-          <a:bodyPr/>
-          <a:lstStyle/>
-          <a:p>
-            <a:r>
-              <a:rPr lang="sr-Latn-RS" dirty="0" smtClean="0"/>
-              <a:t>Couchbase baza podataka</a:t>
-            </a:r>
-            <a:endParaRPr lang="en-US" dirty="0"/>
-          </a:p>
-        </p:txBody>
-      </p:sp>
-      <p:sp>
-        <p:nvSpPr>
-          <p:cNvPr id="3" name="Content Placeholder 2"/>
-          <p:cNvSpPr>
-            <a:spLocks noGrp="1"/>
-          </p:cNvSpPr>
-          <p:nvPr>
-            <p:ph idx="1"/>
-          </p:nvPr>
-        </p:nvSpPr>
-        <p:spPr/>
-        <p:txBody>
-          <a:bodyPr/>
-          <a:lstStyle/>
-          <a:p>
-            <a:r>
-              <a:rPr lang="en-US" dirty="0"/>
-              <a:t>Couchbase je open source </a:t>
-            </a:r>
-            <a:r>
-              <a:rPr lang="sr-Latn-RS" dirty="0" smtClean="0"/>
-              <a:t>distribuirana baza podataka, nastala</a:t>
-            </a:r>
-            <a:r>
-              <a:rPr lang="en-US" dirty="0" smtClean="0"/>
-              <a:t> </a:t>
-            </a:r>
-            <a:r>
-              <a:rPr lang="sr-Latn-RS" dirty="0" smtClean="0"/>
-              <a:t>spajanjem</a:t>
-            </a:r>
-            <a:r>
-              <a:rPr lang="en-US" dirty="0" smtClean="0"/>
-              <a:t> </a:t>
-            </a:r>
-            <a:r>
-              <a:rPr lang="sr-Latn-RS" dirty="0" smtClean="0"/>
-              <a:t>dva rešenja baze podataka </a:t>
-            </a:r>
-            <a:r>
-              <a:rPr lang="en-US" dirty="0" smtClean="0"/>
-              <a:t>– </a:t>
-            </a:r>
-            <a:r>
-              <a:rPr lang="sr-Latn-RS" dirty="0" err="1"/>
-              <a:t>CouchDB</a:t>
-            </a:r>
-            <a:r>
-              <a:rPr lang="en-US" dirty="0"/>
-              <a:t> </a:t>
-            </a:r>
-            <a:r>
-              <a:rPr lang="en-US" dirty="0" err="1"/>
-              <a:t>i</a:t>
-            </a:r>
-            <a:r>
-              <a:rPr lang="en-US" dirty="0"/>
-              <a:t> </a:t>
-            </a:r>
-            <a:r>
-              <a:rPr lang="en-US" dirty="0" err="1"/>
-              <a:t>Membase</a:t>
-            </a:r>
-            <a:endParaRPr lang="en-US" dirty="0"/>
-          </a:p>
-          <a:p>
-            <a:r>
-              <a:rPr lang="en-US" dirty="0" smtClean="0"/>
-              <a:t>S</a:t>
-            </a:r>
-            <a:r>
-              <a:rPr lang="sr-Latn-RS" dirty="0" smtClean="0"/>
-              <a:t>pada </a:t>
-            </a:r>
-            <a:r>
-              <a:rPr lang="sr-Latn-RS" dirty="0"/>
-              <a:t>u grupu </a:t>
-            </a:r>
-            <a:r>
-              <a:rPr lang="sr-Latn-RS" dirty="0" err="1"/>
-              <a:t>document</a:t>
-            </a:r>
-            <a:r>
-              <a:rPr lang="sr-Latn-RS" dirty="0"/>
-              <a:t> baza </a:t>
-            </a:r>
-            <a:r>
-              <a:rPr lang="sr-Latn-RS" dirty="0" smtClean="0"/>
-              <a:t>podataka</a:t>
-            </a:r>
-            <a:endParaRPr lang="en-US" dirty="0" smtClean="0"/>
-          </a:p>
-          <a:p>
-            <a:r>
-              <a:rPr lang="sr-Latn-RS" dirty="0"/>
-              <a:t>Za predstavljanje upita ka bazi koristi se bogat upitni jezik nazvan </a:t>
-            </a:r>
-            <a:r>
-              <a:rPr lang="sr-Latn-RS" dirty="0" smtClean="0"/>
-              <a:t>N1QL</a:t>
-            </a:r>
-            <a:endParaRPr lang="en-US" dirty="0" smtClean="0"/>
-          </a:p>
-          <a:p>
-            <a:r>
-              <a:rPr lang="sr-Latn-RS" dirty="0"/>
-              <a:t>Podaci se kod Couchbase servera mogu čuvati na dva načina - samo u radnoj memoriji (RAM) ili kombinovano u radnoj memoriji i na </a:t>
-            </a:r>
-            <a:r>
-              <a:rPr lang="sr-Latn-RS" dirty="0" smtClean="0"/>
-              <a:t>disku</a:t>
-            </a:r>
-            <a:endParaRPr lang="en-US" dirty="0" smtClean="0"/>
-          </a:p>
-          <a:p>
-            <a:r>
-              <a:rPr lang="sr-Latn-RS" dirty="0" smtClean="0"/>
-              <a:t>Po CAP teoremi se može svrstati u CP ili AP</a:t>
-            </a:r>
-            <a:endParaRPr lang="sr-Latn-RS" dirty="0"/>
-          </a:p>
-        </p:txBody>
-      </p:sp>
-    </p:spTree>
-    <p:extLst>
-      <p:ext uri="{BB962C8B-B14F-4D97-AF65-F5344CB8AC3E}">
-        <p14:creationId xmlns:p14="http://schemas.microsoft.com/office/powerpoint/2010/main" val="135268690"/>
-      </p:ext>
-    </p:extLst>
-  </p:cSld>
-  <p:clrMapOvr>
-    <a:masterClrMapping/>
-  </p:clrMapOvr>
-  <p:timing>
-    <p:tnLst>
-      <p:par>
-        <p:cTn id="1" dur="indefinite" restart="never" nodeType="tmRoot"/>
-      </p:par>
-    </p:tnLst>
-  </p:timing>
-</p:sld>
-</file>
-
-<file path=ppt/slides/slide11.xml><?xml version="1.0" encoding="utf-8"?>
-<p:sld xmlns:a="http://schemas.openxmlformats.org/drawingml/2006/main" xmlns:r="http://schemas.openxmlformats.org/officeDocument/2006/relationships" xmlns:p="http://schemas.openxmlformats.org/presentationml/2006/main">
-  <p:cSld>
-    <p:spTree>
-      <p:nvGrpSpPr>
-        <p:cNvPr id="1" name=""/>
-        <p:cNvGrpSpPr/>
-        <p:nvPr/>
-      </p:nvGrpSpPr>
-      <p:grpSpPr>
-        <a:xfrm>
-          <a:off x="0" y="0"/>
-          <a:ext cx="0" cy="0"/>
-          <a:chOff x="0" y="0"/>
-          <a:chExt cx="0" cy="0"/>
-        </a:xfrm>
-      </p:grpSpPr>
-      <p:sp>
-        <p:nvSpPr>
-          <p:cNvPr id="2" name="Title 1"/>
-          <p:cNvSpPr>
-            <a:spLocks noGrp="1"/>
-          </p:cNvSpPr>
-          <p:nvPr>
-            <p:ph type="title"/>
-          </p:nvPr>
-        </p:nvSpPr>
-        <p:spPr/>
-        <p:txBody>
-          <a:bodyPr/>
-          <a:lstStyle/>
-          <a:p>
-            <a:r>
-              <a:rPr lang="sr-Latn-RS" dirty="0"/>
-              <a:t>Couchbase </a:t>
-            </a:r>
-            <a:r>
-              <a:rPr lang="sr-Latn-RS" dirty="0" smtClean="0"/>
-              <a:t>klaster</a:t>
-            </a:r>
-            <a:r>
-              <a:rPr lang="sr-Latn-RS" dirty="0"/>
-              <a:t> </a:t>
-            </a:r>
-            <a:r>
-              <a:rPr lang="sr-Latn-RS" dirty="0" smtClean="0"/>
-              <a:t>i servisi</a:t>
-            </a:r>
-            <a:endParaRPr lang="sr-Latn-RS" dirty="0"/>
-          </a:p>
-        </p:txBody>
-      </p:sp>
-      <p:sp>
-        <p:nvSpPr>
-          <p:cNvPr id="3" name="Content Placeholder 2"/>
-          <p:cNvSpPr>
-            <a:spLocks noGrp="1"/>
-          </p:cNvSpPr>
-          <p:nvPr>
-            <p:ph idx="1"/>
-          </p:nvPr>
-        </p:nvSpPr>
-        <p:spPr/>
-        <p:txBody>
-          <a:bodyPr/>
-          <a:lstStyle/>
-          <a:p>
-            <a:r>
-              <a:rPr lang="sr-Latn-RS" dirty="0"/>
-              <a:t>Couchbase klaster se sastoji od jedne ili više instanci Couchbase servera pri čemu se svaki server pokreće na nezavisnom </a:t>
-            </a:r>
-            <a:r>
-              <a:rPr lang="sr-Latn-RS" dirty="0" smtClean="0"/>
-              <a:t>čvoru</a:t>
-            </a:r>
-            <a:endParaRPr lang="en-US" dirty="0" smtClean="0"/>
-          </a:p>
-          <a:p>
-            <a:r>
-              <a:rPr lang="en-US" dirty="0" smtClean="0"/>
-              <a:t>N</a:t>
-            </a:r>
-            <a:r>
-              <a:rPr lang="sr-Latn-RS" dirty="0" smtClean="0"/>
-              <a:t>a </a:t>
-            </a:r>
-            <a:r>
-              <a:rPr lang="sr-Latn-RS" dirty="0"/>
-              <a:t>svakom čvoru je pokrenut Couchbase </a:t>
-            </a:r>
-            <a:r>
-              <a:rPr lang="sr-Latn-RS" dirty="0" err="1"/>
-              <a:t>Cluster</a:t>
-            </a:r>
-            <a:r>
-              <a:rPr lang="sr-Latn-RS" dirty="0"/>
-              <a:t> </a:t>
-            </a:r>
-            <a:r>
-              <a:rPr lang="sr-Latn-RS" dirty="0" err="1"/>
-              <a:t>Manager</a:t>
-            </a:r>
-            <a:r>
-              <a:rPr lang="sr-Latn-RS" dirty="0"/>
-              <a:t> koji upravlja komunikacijom između čvorova i obezbeđuje da su svi čvorovi </a:t>
-            </a:r>
-            <a:r>
-              <a:rPr lang="sr-Latn-RS" dirty="0" smtClean="0"/>
-              <a:t>stabilni</a:t>
-            </a:r>
-          </a:p>
-          <a:p>
-            <a:r>
-              <a:rPr lang="sr-Latn-RS" dirty="0"/>
-              <a:t>Svaki servis se može </a:t>
-            </a:r>
-            <a:r>
-              <a:rPr lang="sr-Latn-RS" dirty="0" err="1"/>
-              <a:t>deploy-ovati</a:t>
-            </a:r>
-            <a:r>
-              <a:rPr lang="sr-Latn-RS" dirty="0"/>
-              <a:t> i održavati nezavisno od ostalih i na taj način obezbeđuje veliku sposobnost </a:t>
-            </a:r>
-            <a:r>
-              <a:rPr lang="sr-Latn-RS" dirty="0" err="1"/>
-              <a:t>skaliranja</a:t>
-            </a:r>
-            <a:r>
-              <a:rPr lang="sr-Latn-RS" dirty="0"/>
-              <a:t> </a:t>
-            </a:r>
-            <a:r>
-              <a:rPr lang="sr-Latn-RS" dirty="0" smtClean="0"/>
-              <a:t>sistema</a:t>
-            </a:r>
-          </a:p>
-          <a:p>
-            <a:r>
-              <a:rPr lang="sr-Latn-RS" dirty="0" smtClean="0"/>
-              <a:t>Couchbase podržava sledeće servise: Data, </a:t>
-            </a:r>
-            <a:r>
-              <a:rPr lang="sr-Latn-RS" dirty="0" err="1" smtClean="0"/>
-              <a:t>Query</a:t>
-            </a:r>
-            <a:r>
-              <a:rPr lang="sr-Latn-RS" dirty="0" smtClean="0"/>
-              <a:t>, </a:t>
-            </a:r>
-            <a:r>
-              <a:rPr lang="sr-Latn-RS" dirty="0" err="1" smtClean="0"/>
-              <a:t>Index</a:t>
-            </a:r>
-            <a:r>
-              <a:rPr lang="sr-Latn-RS" dirty="0" smtClean="0"/>
-              <a:t>, </a:t>
-            </a:r>
-            <a:r>
-              <a:rPr lang="sr-Latn-RS" dirty="0" err="1" smtClean="0"/>
-              <a:t>Search</a:t>
-            </a:r>
-            <a:r>
-              <a:rPr lang="sr-Latn-RS" dirty="0" smtClean="0"/>
-              <a:t>, </a:t>
-            </a:r>
-            <a:r>
-              <a:rPr lang="sr-Latn-RS" dirty="0" err="1" smtClean="0"/>
-              <a:t>Analytics</a:t>
-            </a:r>
-            <a:r>
-              <a:rPr lang="sr-Latn-RS" dirty="0" smtClean="0"/>
-              <a:t>, </a:t>
-            </a:r>
-            <a:r>
-              <a:rPr lang="sr-Latn-RS" dirty="0" err="1" smtClean="0"/>
-              <a:t>Eventing</a:t>
-            </a:r>
-            <a:endParaRPr lang="en-US" dirty="0"/>
-          </a:p>
-        </p:txBody>
-      </p:sp>
-    </p:spTree>
-    <p:extLst>
-      <p:ext uri="{BB962C8B-B14F-4D97-AF65-F5344CB8AC3E}">
-        <p14:creationId xmlns:p14="http://schemas.microsoft.com/office/powerpoint/2010/main" val="3174897274"/>
-      </p:ext>
-    </p:extLst>
-  </p:cSld>
-  <p:clrMapOvr>
-    <a:masterClrMapping/>
-  </p:clrMapOvr>
-</p:sld>
-</file>
-
-<file path=ppt/slides/slide12.xml><?xml version="1.0" encoding="utf-8"?>
 <p:sld xmlns:a="http://schemas.openxmlformats.org/drawingml/2006/main" xmlns:r="http://schemas.openxmlformats.org/officeDocument/2006/relationships" xmlns:p="http://schemas.openxmlformats.org/presentationml/2006/main">
   <p:cSld>
     <p:spTree>
@@ -6718,7 +6298,7 @@
 </p:sld>
 </file>
 
-<file path=ppt/slides/slide13.xml><?xml version="1.0" encoding="utf-8"?>
+<file path=ppt/slides/slide11.xml><?xml version="1.0" encoding="utf-8"?>
 <p:sld xmlns:a="http://schemas.openxmlformats.org/drawingml/2006/main" xmlns:r="http://schemas.openxmlformats.org/officeDocument/2006/relationships" xmlns:p="http://schemas.openxmlformats.org/presentationml/2006/main">
   <p:cSld>
     <p:spTree>
@@ -6975,6 +6555,36 @@
           </a:extLst>
         </p:spPr>
       </p:pic>
+      <p:pic>
+        <p:nvPicPr>
+          <p:cNvPr id="5" name="Picture 4"/>
+          <p:cNvPicPr>
+            <a:picLocks noChangeAspect="1"/>
+          </p:cNvPicPr>
+          <p:nvPr/>
+        </p:nvPicPr>
+        <p:blipFill>
+          <a:blip r:embed="rId3">
+            <a:extLst>
+              <a:ext uri="{28A0092B-C50C-407E-A947-70E740481C1C}">
+                <a14:useLocalDpi xmlns:a14="http://schemas.microsoft.com/office/drawing/2010/main" val="0"/>
+              </a:ext>
+            </a:extLst>
+          </a:blip>
+          <a:stretch>
+            <a:fillRect/>
+          </a:stretch>
+        </p:blipFill>
+        <p:spPr>
+          <a:xfrm>
+            <a:off x="9492183" y="5792338"/>
+            <a:ext cx="2580233" cy="912121"/>
+          </a:xfrm>
+          <a:prstGeom prst="rect">
+            <a:avLst/>
+          </a:prstGeom>
+        </p:spPr>
+      </p:pic>
     </p:spTree>
     <p:extLst>
       <p:ext uri="{BB962C8B-B14F-4D97-AF65-F5344CB8AC3E}">
@@ -6988,7 +6598,7 @@
 </p:sld>
 </file>
 
-<file path=ppt/slides/slide14.xml><?xml version="1.0" encoding="utf-8"?>
+<file path=ppt/slides/slide12.xml><?xml version="1.0" encoding="utf-8"?>
 <p:sld xmlns:a="http://schemas.openxmlformats.org/drawingml/2006/main" xmlns:r="http://schemas.openxmlformats.org/officeDocument/2006/relationships" xmlns:p="http://schemas.openxmlformats.org/presentationml/2006/main">
   <p:cSld>
     <p:spTree>
@@ -7089,6 +6699,36 @@
           </a:p>
         </p:txBody>
       </p:sp>
+      <p:pic>
+        <p:nvPicPr>
+          <p:cNvPr id="4" name="Picture 3"/>
+          <p:cNvPicPr>
+            <a:picLocks noChangeAspect="1"/>
+          </p:cNvPicPr>
+          <p:nvPr/>
+        </p:nvPicPr>
+        <p:blipFill>
+          <a:blip r:embed="rId2">
+            <a:extLst>
+              <a:ext uri="{28A0092B-C50C-407E-A947-70E740481C1C}">
+                <a14:useLocalDpi xmlns:a14="http://schemas.microsoft.com/office/drawing/2010/main" val="0"/>
+              </a:ext>
+            </a:extLst>
+          </a:blip>
+          <a:stretch>
+            <a:fillRect/>
+          </a:stretch>
+        </p:blipFill>
+        <p:spPr>
+          <a:xfrm>
+            <a:off x="9492183" y="5792338"/>
+            <a:ext cx="2580233" cy="912121"/>
+          </a:xfrm>
+          <a:prstGeom prst="rect">
+            <a:avLst/>
+          </a:prstGeom>
+        </p:spPr>
+      </p:pic>
     </p:spTree>
     <p:extLst>
       <p:ext uri="{BB962C8B-B14F-4D97-AF65-F5344CB8AC3E}">
@@ -7102,7 +6742,7 @@
 </p:sld>
 </file>
 
-<file path=ppt/slides/slide15.xml><?xml version="1.0" encoding="utf-8"?>
+<file path=ppt/slides/slide13.xml><?xml version="1.0" encoding="utf-8"?>
 <p:sld xmlns:a="http://schemas.openxmlformats.org/drawingml/2006/main" xmlns:r="http://schemas.openxmlformats.org/officeDocument/2006/relationships" xmlns:p="http://schemas.openxmlformats.org/presentationml/2006/main">
   <p:cSld>
     <p:spTree>
@@ -7236,6 +6876,36 @@
           </a:p>
         </p:txBody>
       </p:sp>
+      <p:pic>
+        <p:nvPicPr>
+          <p:cNvPr id="4" name="Picture 3"/>
+          <p:cNvPicPr>
+            <a:picLocks noChangeAspect="1"/>
+          </p:cNvPicPr>
+          <p:nvPr/>
+        </p:nvPicPr>
+        <p:blipFill>
+          <a:blip r:embed="rId2">
+            <a:extLst>
+              <a:ext uri="{28A0092B-C50C-407E-A947-70E740481C1C}">
+                <a14:useLocalDpi xmlns:a14="http://schemas.microsoft.com/office/drawing/2010/main" val="0"/>
+              </a:ext>
+            </a:extLst>
+          </a:blip>
+          <a:stretch>
+            <a:fillRect/>
+          </a:stretch>
+        </p:blipFill>
+        <p:spPr>
+          <a:xfrm>
+            <a:off x="9492183" y="5792338"/>
+            <a:ext cx="2580233" cy="912121"/>
+          </a:xfrm>
+          <a:prstGeom prst="rect">
+            <a:avLst/>
+          </a:prstGeom>
+        </p:spPr>
+      </p:pic>
     </p:spTree>
     <p:extLst>
       <p:ext uri="{BB962C8B-B14F-4D97-AF65-F5344CB8AC3E}">
@@ -7249,7 +6919,7 @@
 </p:sld>
 </file>
 
-<file path=ppt/slides/slide16.xml><?xml version="1.0" encoding="utf-8"?>
+<file path=ppt/slides/slide14.xml><?xml version="1.0" encoding="utf-8"?>
 <p:sld xmlns:a="http://schemas.openxmlformats.org/drawingml/2006/main" xmlns:r="http://schemas.openxmlformats.org/officeDocument/2006/relationships" xmlns:p="http://schemas.openxmlformats.org/presentationml/2006/main">
   <p:cSld>
     <p:spTree>
@@ -7494,7 +7164,7 @@
 </p:sld>
 </file>
 
-<file path=ppt/slides/slide17.xml><?xml version="1.0" encoding="utf-8"?>
+<file path=ppt/slides/slide15.xml><?xml version="1.0" encoding="utf-8"?>
 <p:sld xmlns:a="http://schemas.openxmlformats.org/drawingml/2006/main" xmlns:r="http://schemas.openxmlformats.org/officeDocument/2006/relationships" xmlns:p="http://schemas.openxmlformats.org/presentationml/2006/main">
   <p:cSld>
     <p:spTree>
@@ -7655,7 +7325,7 @@
 </p:sld>
 </file>
 
-<file path=ppt/slides/slide18.xml><?xml version="1.0" encoding="utf-8"?>
+<file path=ppt/slides/slide16.xml><?xml version="1.0" encoding="utf-8"?>
 <p:sld xmlns:a="http://schemas.openxmlformats.org/drawingml/2006/main" xmlns:r="http://schemas.openxmlformats.org/officeDocument/2006/relationships" xmlns:p="http://schemas.openxmlformats.org/presentationml/2006/main">
   <p:cSld>
     <p:spTree>
@@ -7820,7 +7490,7 @@
 </p:sld>
 </file>
 
-<file path=ppt/slides/slide19.xml><?xml version="1.0" encoding="utf-8"?>
+<file path=ppt/slides/slide17.xml><?xml version="1.0" encoding="utf-8"?>
 <p:sld xmlns:a="http://schemas.openxmlformats.org/drawingml/2006/main" xmlns:r="http://schemas.openxmlformats.org/officeDocument/2006/relationships" xmlns:p="http://schemas.openxmlformats.org/presentationml/2006/main">
   <p:cSld>
     <p:spTree>
@@ -7986,6 +7656,280 @@
 </p:sld>
 </file>
 
+<file path=ppt/slides/slide18.xml><?xml version="1.0" encoding="utf-8"?>
+<p:sld xmlns:a="http://schemas.openxmlformats.org/drawingml/2006/main" xmlns:r="http://schemas.openxmlformats.org/officeDocument/2006/relationships" xmlns:p="http://schemas.openxmlformats.org/presentationml/2006/main">
+  <p:cSld>
+    <p:spTree>
+      <p:nvGrpSpPr>
+        <p:cNvPr id="1" name=""/>
+        <p:cNvGrpSpPr/>
+        <p:nvPr/>
+      </p:nvGrpSpPr>
+      <p:grpSpPr>
+        <a:xfrm>
+          <a:off x="0" y="0"/>
+          <a:ext cx="0" cy="0"/>
+          <a:chOff x="0" y="0"/>
+          <a:chExt cx="0" cy="0"/>
+        </a:xfrm>
+      </p:grpSpPr>
+      <p:sp>
+        <p:nvSpPr>
+          <p:cNvPr id="2" name="Title 1"/>
+          <p:cNvSpPr>
+            <a:spLocks noGrp="1"/>
+          </p:cNvSpPr>
+          <p:nvPr>
+            <p:ph type="title"/>
+          </p:nvPr>
+        </p:nvSpPr>
+        <p:spPr/>
+        <p:txBody>
+          <a:bodyPr/>
+          <a:lstStyle/>
+          <a:p>
+            <a:r>
+              <a:rPr lang="sr-Latn-RS" dirty="0"/>
+              <a:t>Primer – Transakcija i regularni upis</a:t>
+            </a:r>
+            <a:endParaRPr lang="en-US" dirty="0"/>
+          </a:p>
+        </p:txBody>
+      </p:sp>
+      <p:pic>
+        <p:nvPicPr>
+          <p:cNvPr id="5122" name="Picture 2" descr="Untitled"/>
+          <p:cNvPicPr>
+            <a:picLocks noChangeAspect="1" noChangeArrowheads="1"/>
+          </p:cNvPicPr>
+          <p:nvPr/>
+        </p:nvPicPr>
+        <p:blipFill>
+          <a:blip r:embed="rId2">
+            <a:extLst>
+              <a:ext uri="{28A0092B-C50C-407E-A947-70E740481C1C}">
+                <a14:useLocalDpi xmlns:a14="http://schemas.microsoft.com/office/drawing/2010/main" val="0"/>
+              </a:ext>
+            </a:extLst>
+          </a:blip>
+          <a:srcRect/>
+          <a:stretch>
+            <a:fillRect/>
+          </a:stretch>
+        </p:blipFill>
+        <p:spPr bwMode="auto">
+          <a:xfrm>
+            <a:off x="1563418" y="1497021"/>
+            <a:ext cx="7570107" cy="5360979"/>
+          </a:xfrm>
+          <a:prstGeom prst="rect">
+            <a:avLst/>
+          </a:prstGeom>
+          <a:noFill/>
+          <a:ln>
+            <a:noFill/>
+          </a:ln>
+          <a:extLst>
+            <a:ext uri="{909E8E84-426E-40DD-AFC4-6F175D3DCCD1}">
+              <a14:hiddenFill xmlns:a14="http://schemas.microsoft.com/office/drawing/2010/main">
+                <a:solidFill>
+                  <a:srgbClr val="FFFFFF"/>
+                </a:solidFill>
+              </a14:hiddenFill>
+            </a:ext>
+            <a:ext uri="{91240B29-F687-4F45-9708-019B960494DF}">
+              <a14:hiddenLine xmlns:a14="http://schemas.microsoft.com/office/drawing/2010/main" w="9525">
+                <a:solidFill>
+                  <a:srgbClr val="000000"/>
+                </a:solidFill>
+                <a:miter lim="800000"/>
+                <a:headEnd/>
+                <a:tailEnd/>
+              </a14:hiddenLine>
+            </a:ext>
+          </a:extLst>
+        </p:spPr>
+      </p:pic>
+      <p:pic>
+        <p:nvPicPr>
+          <p:cNvPr id="4" name="Picture 3"/>
+          <p:cNvPicPr>
+            <a:picLocks noChangeAspect="1"/>
+          </p:cNvPicPr>
+          <p:nvPr/>
+        </p:nvPicPr>
+        <p:blipFill>
+          <a:blip r:embed="rId3">
+            <a:extLst>
+              <a:ext uri="{28A0092B-C50C-407E-A947-70E740481C1C}">
+                <a14:useLocalDpi xmlns:a14="http://schemas.microsoft.com/office/drawing/2010/main" val="0"/>
+              </a:ext>
+            </a:extLst>
+          </a:blip>
+          <a:stretch>
+            <a:fillRect/>
+          </a:stretch>
+        </p:blipFill>
+        <p:spPr>
+          <a:xfrm>
+            <a:off x="9492183" y="5792338"/>
+            <a:ext cx="2580233" cy="912121"/>
+          </a:xfrm>
+          <a:prstGeom prst="rect">
+            <a:avLst/>
+          </a:prstGeom>
+        </p:spPr>
+      </p:pic>
+    </p:spTree>
+    <p:extLst>
+      <p:ext uri="{BB962C8B-B14F-4D97-AF65-F5344CB8AC3E}">
+        <p14:creationId xmlns:p14="http://schemas.microsoft.com/office/powerpoint/2010/main" val="3253521857"/>
+      </p:ext>
+    </p:extLst>
+  </p:cSld>
+  <p:clrMapOvr>
+    <a:masterClrMapping/>
+  </p:clrMapOvr>
+</p:sld>
+</file>
+
+<file path=ppt/slides/slide19.xml><?xml version="1.0" encoding="utf-8"?>
+<p:sld xmlns:a="http://schemas.openxmlformats.org/drawingml/2006/main" xmlns:r="http://schemas.openxmlformats.org/officeDocument/2006/relationships" xmlns:p="http://schemas.openxmlformats.org/presentationml/2006/main">
+  <p:cSld>
+    <p:spTree>
+      <p:nvGrpSpPr>
+        <p:cNvPr id="1" name=""/>
+        <p:cNvGrpSpPr/>
+        <p:nvPr/>
+      </p:nvGrpSpPr>
+      <p:grpSpPr>
+        <a:xfrm>
+          <a:off x="0" y="0"/>
+          <a:ext cx="0" cy="0"/>
+          <a:chOff x="0" y="0"/>
+          <a:chExt cx="0" cy="0"/>
+        </a:xfrm>
+      </p:grpSpPr>
+      <p:sp>
+        <p:nvSpPr>
+          <p:cNvPr id="2" name="Title 1"/>
+          <p:cNvSpPr>
+            <a:spLocks noGrp="1"/>
+          </p:cNvSpPr>
+          <p:nvPr>
+            <p:ph type="title"/>
+          </p:nvPr>
+        </p:nvSpPr>
+        <p:spPr/>
+        <p:txBody>
+          <a:bodyPr/>
+          <a:lstStyle/>
+          <a:p>
+            <a:r>
+              <a:rPr lang="sr-Latn-RS" dirty="0" smtClean="0"/>
+              <a:t>Primer – Dva klijenta sa konkurentnim transakcijama</a:t>
+            </a:r>
+            <a:endParaRPr lang="en-US" dirty="0"/>
+          </a:p>
+        </p:txBody>
+      </p:sp>
+      <p:pic>
+        <p:nvPicPr>
+          <p:cNvPr id="6146" name="Picture 2" descr="Untitled8"/>
+          <p:cNvPicPr>
+            <a:picLocks noChangeAspect="1" noChangeArrowheads="1"/>
+          </p:cNvPicPr>
+          <p:nvPr/>
+        </p:nvPicPr>
+        <p:blipFill>
+          <a:blip r:embed="rId2">
+            <a:extLst>
+              <a:ext uri="{28A0092B-C50C-407E-A947-70E740481C1C}">
+                <a14:useLocalDpi xmlns:a14="http://schemas.microsoft.com/office/drawing/2010/main" val="0"/>
+              </a:ext>
+            </a:extLst>
+          </a:blip>
+          <a:srcRect/>
+          <a:stretch>
+            <a:fillRect/>
+          </a:stretch>
+        </p:blipFill>
+        <p:spPr bwMode="auto">
+          <a:xfrm>
+            <a:off x="646111" y="1979039"/>
+            <a:ext cx="8404451" cy="4587316"/>
+          </a:xfrm>
+          <a:prstGeom prst="rect">
+            <a:avLst/>
+          </a:prstGeom>
+          <a:noFill/>
+          <a:ln>
+            <a:noFill/>
+          </a:ln>
+          <a:extLst>
+            <a:ext uri="{909E8E84-426E-40DD-AFC4-6F175D3DCCD1}">
+              <a14:hiddenFill xmlns:a14="http://schemas.microsoft.com/office/drawing/2010/main">
+                <a:solidFill>
+                  <a:srgbClr val="FFFFFF"/>
+                </a:solidFill>
+              </a14:hiddenFill>
+            </a:ext>
+            <a:ext uri="{91240B29-F687-4F45-9708-019B960494DF}">
+              <a14:hiddenLine xmlns:a14="http://schemas.microsoft.com/office/drawing/2010/main" w="9525">
+                <a:solidFill>
+                  <a:srgbClr val="000000"/>
+                </a:solidFill>
+                <a:miter lim="800000"/>
+                <a:headEnd/>
+                <a:tailEnd/>
+              </a14:hiddenLine>
+            </a:ext>
+          </a:extLst>
+        </p:spPr>
+      </p:pic>
+      <p:pic>
+        <p:nvPicPr>
+          <p:cNvPr id="4" name="Picture 3"/>
+          <p:cNvPicPr>
+            <a:picLocks noChangeAspect="1"/>
+          </p:cNvPicPr>
+          <p:nvPr/>
+        </p:nvPicPr>
+        <p:blipFill>
+          <a:blip r:embed="rId3">
+            <a:extLst>
+              <a:ext uri="{28A0092B-C50C-407E-A947-70E740481C1C}">
+                <a14:useLocalDpi xmlns:a14="http://schemas.microsoft.com/office/drawing/2010/main" val="0"/>
+              </a:ext>
+            </a:extLst>
+          </a:blip>
+          <a:stretch>
+            <a:fillRect/>
+          </a:stretch>
+        </p:blipFill>
+        <p:spPr>
+          <a:xfrm>
+            <a:off x="9492183" y="5792338"/>
+            <a:ext cx="2580233" cy="912121"/>
+          </a:xfrm>
+          <a:prstGeom prst="rect">
+            <a:avLst/>
+          </a:prstGeom>
+        </p:spPr>
+      </p:pic>
+    </p:spTree>
+    <p:extLst>
+      <p:ext uri="{BB962C8B-B14F-4D97-AF65-F5344CB8AC3E}">
+        <p14:creationId xmlns:p14="http://schemas.microsoft.com/office/powerpoint/2010/main" val="769877466"/>
+      </p:ext>
+    </p:extLst>
+  </p:cSld>
+  <p:clrMapOvr>
+    <a:masterClrMapping/>
+  </p:clrMapOvr>
+</p:sld>
+</file>
+
 <file path=ppt/slides/slide2.xml><?xml version="1.0" encoding="utf-8"?>
 <p:sld xmlns:a="http://schemas.openxmlformats.org/drawingml/2006/main" xmlns:r="http://schemas.openxmlformats.org/officeDocument/2006/relationships" xmlns:p="http://schemas.openxmlformats.org/presentationml/2006/main">
   <p:cSld>
@@ -8019,8 +7963,16 @@
           <a:lstStyle/>
           <a:p>
             <a:r>
+              <a:rPr lang="sr-Latn-RS" dirty="0" smtClean="0"/>
+              <a:t>Distribuirane </a:t>
+            </a:r>
+            <a:r>
               <a:rPr lang="sr-Latn-RS" dirty="0"/>
-              <a:t>Tipovi distribuiranih baza podataka</a:t>
+              <a:t>baza </a:t>
+            </a:r>
+            <a:r>
+              <a:rPr lang="sr-Latn-RS" dirty="0" smtClean="0"/>
+              <a:t>podataka i njihova podela</a:t>
             </a:r>
             <a:endParaRPr lang="en-US" dirty="0"/>
           </a:p>
@@ -8036,14 +7988,46 @@
             <p:ph idx="1"/>
           </p:nvPr>
         </p:nvSpPr>
-        <p:spPr/>
+        <p:spPr>
+          <a:xfrm>
+            <a:off x="1103313" y="2052918"/>
+            <a:ext cx="5346474" cy="4195481"/>
+          </a:xfrm>
+        </p:spPr>
         <p:txBody>
           <a:bodyPr/>
           <a:lstStyle/>
           <a:p>
             <a:r>
+              <a:rPr lang="sr-Latn-RS" dirty="0" smtClean="0"/>
+              <a:t>Distribuirana baza podataka (DDB) je kolekcija logički povezanih baza podataka koje su povezane računarskom mrežom </a:t>
+            </a:r>
+            <a:endParaRPr lang="en-US" dirty="0" smtClean="0"/>
+          </a:p>
+          <a:p>
+            <a:pPr marL="0" indent="0">
+              <a:buNone/>
+            </a:pPr>
+            <a:endParaRPr lang="en-US" dirty="0"/>
+          </a:p>
+          <a:p>
+            <a:pPr marL="0" indent="0">
+              <a:buNone/>
+            </a:pPr>
+            <a:r>
+              <a:rPr lang="sr-Latn-RS" dirty="0" smtClean="0"/>
+              <a:t>Tipovi distribuiranih baza:</a:t>
+            </a:r>
+            <a:endParaRPr lang="sr-Latn-RS" dirty="0"/>
+          </a:p>
+          <a:p>
+            <a:r>
+              <a:rPr lang="sr-Latn-RS" dirty="0" smtClean="0"/>
+              <a:t>Tradicionalne </a:t>
+            </a:r>
+            <a:r>
               <a:rPr lang="sr-Latn-RS" dirty="0"/>
-              <a:t>Tradicionalne centralizovane sisteme </a:t>
+              <a:t>centralizovane sisteme </a:t>
             </a:r>
             <a:endParaRPr lang="en-US" dirty="0" smtClean="0"/>
           </a:p>
@@ -8183,24 +8167,29 @@
             <p:ph type="title"/>
           </p:nvPr>
         </p:nvSpPr>
-        <p:spPr/>
+        <p:spPr>
+          <a:xfrm>
+            <a:off x="1707468" y="2706062"/>
+            <a:ext cx="9404723" cy="1400530"/>
+          </a:xfrm>
+        </p:spPr>
         <p:txBody>
           <a:bodyPr/>
           <a:lstStyle/>
           <a:p>
             <a:r>
-              <a:rPr lang="sr-Latn-RS" dirty="0"/>
-              <a:t>Primer – Transakcija i regularni upis</a:t>
-            </a:r>
-            <a:endParaRPr lang="en-US" dirty="0"/>
+              <a:rPr lang="sr-Latn-RS" sz="7200" dirty="0" smtClean="0"/>
+              <a:t>Hvala na pažnji</a:t>
+            </a:r>
+            <a:endParaRPr lang="en-US" sz="7200" dirty="0"/>
           </a:p>
         </p:txBody>
       </p:sp>
       <p:pic>
         <p:nvPicPr>
-          <p:cNvPr id="5122" name="Picture 2" descr="Untitled"/>
+          <p:cNvPr id="3" name="Picture 2"/>
           <p:cNvPicPr>
-            <a:picLocks noChangeAspect="1" noChangeArrowheads="1"/>
+            <a:picLocks noChangeAspect="1"/>
           </p:cNvPicPr>
           <p:nvPr/>
         </p:nvPicPr>
@@ -8212,209 +8201,20 @@
               </a:ext>
             </a:extLst>
           </a:blip>
-          <a:srcRect/>
           <a:stretch>
             <a:fillRect/>
           </a:stretch>
         </p:blipFill>
-        <p:spPr bwMode="auto">
+        <p:spPr>
           <a:xfrm>
-            <a:off x="1563418" y="1497021"/>
-            <a:ext cx="7570107" cy="5360979"/>
+            <a:off x="9492183" y="5792338"/>
+            <a:ext cx="2580233" cy="912121"/>
           </a:xfrm>
           <a:prstGeom prst="rect">
             <a:avLst/>
           </a:prstGeom>
-          <a:noFill/>
-          <a:ln>
-            <a:noFill/>
-          </a:ln>
-          <a:extLst>
-            <a:ext uri="{909E8E84-426E-40DD-AFC4-6F175D3DCCD1}">
-              <a14:hiddenFill xmlns:a14="http://schemas.microsoft.com/office/drawing/2010/main">
-                <a:solidFill>
-                  <a:srgbClr val="FFFFFF"/>
-                </a:solidFill>
-              </a14:hiddenFill>
-            </a:ext>
-            <a:ext uri="{91240B29-F687-4F45-9708-019B960494DF}">
-              <a14:hiddenLine xmlns:a14="http://schemas.microsoft.com/office/drawing/2010/main" w="9525">
-                <a:solidFill>
-                  <a:srgbClr val="000000"/>
-                </a:solidFill>
-                <a:miter lim="800000"/>
-                <a:headEnd/>
-                <a:tailEnd/>
-              </a14:hiddenLine>
-            </a:ext>
-          </a:extLst>
         </p:spPr>
       </p:pic>
-    </p:spTree>
-    <p:extLst>
-      <p:ext uri="{BB962C8B-B14F-4D97-AF65-F5344CB8AC3E}">
-        <p14:creationId xmlns:p14="http://schemas.microsoft.com/office/powerpoint/2010/main" val="3253521857"/>
-      </p:ext>
-    </p:extLst>
-  </p:cSld>
-  <p:clrMapOvr>
-    <a:masterClrMapping/>
-  </p:clrMapOvr>
-</p:sld>
-</file>
-
-<file path=ppt/slides/slide21.xml><?xml version="1.0" encoding="utf-8"?>
-<p:sld xmlns:a="http://schemas.openxmlformats.org/drawingml/2006/main" xmlns:r="http://schemas.openxmlformats.org/officeDocument/2006/relationships" xmlns:p="http://schemas.openxmlformats.org/presentationml/2006/main">
-  <p:cSld>
-    <p:spTree>
-      <p:nvGrpSpPr>
-        <p:cNvPr id="1" name=""/>
-        <p:cNvGrpSpPr/>
-        <p:nvPr/>
-      </p:nvGrpSpPr>
-      <p:grpSpPr>
-        <a:xfrm>
-          <a:off x="0" y="0"/>
-          <a:ext cx="0" cy="0"/>
-          <a:chOff x="0" y="0"/>
-          <a:chExt cx="0" cy="0"/>
-        </a:xfrm>
-      </p:grpSpPr>
-      <p:sp>
-        <p:nvSpPr>
-          <p:cNvPr id="2" name="Title 1"/>
-          <p:cNvSpPr>
-            <a:spLocks noGrp="1"/>
-          </p:cNvSpPr>
-          <p:nvPr>
-            <p:ph type="title"/>
-          </p:nvPr>
-        </p:nvSpPr>
-        <p:spPr/>
-        <p:txBody>
-          <a:bodyPr/>
-          <a:lstStyle/>
-          <a:p>
-            <a:r>
-              <a:rPr lang="sr-Latn-RS" dirty="0" smtClean="0"/>
-              <a:t>Primer – Dva klijenta sa konkurentnim transakcijama</a:t>
-            </a:r>
-            <a:endParaRPr lang="en-US" dirty="0"/>
-          </a:p>
-        </p:txBody>
-      </p:sp>
-      <p:pic>
-        <p:nvPicPr>
-          <p:cNvPr id="6146" name="Picture 2" descr="Untitled8"/>
-          <p:cNvPicPr>
-            <a:picLocks noChangeAspect="1" noChangeArrowheads="1"/>
-          </p:cNvPicPr>
-          <p:nvPr/>
-        </p:nvPicPr>
-        <p:blipFill>
-          <a:blip r:embed="rId2">
-            <a:extLst>
-              <a:ext uri="{28A0092B-C50C-407E-A947-70E740481C1C}">
-                <a14:useLocalDpi xmlns:a14="http://schemas.microsoft.com/office/drawing/2010/main" val="0"/>
-              </a:ext>
-            </a:extLst>
-          </a:blip>
-          <a:srcRect/>
-          <a:stretch>
-            <a:fillRect/>
-          </a:stretch>
-        </p:blipFill>
-        <p:spPr bwMode="auto">
-          <a:xfrm>
-            <a:off x="646111" y="1979039"/>
-            <a:ext cx="8404451" cy="4587316"/>
-          </a:xfrm>
-          <a:prstGeom prst="rect">
-            <a:avLst/>
-          </a:prstGeom>
-          <a:noFill/>
-          <a:ln>
-            <a:noFill/>
-          </a:ln>
-          <a:extLst>
-            <a:ext uri="{909E8E84-426E-40DD-AFC4-6F175D3DCCD1}">
-              <a14:hiddenFill xmlns:a14="http://schemas.microsoft.com/office/drawing/2010/main">
-                <a:solidFill>
-                  <a:srgbClr val="FFFFFF"/>
-                </a:solidFill>
-              </a14:hiddenFill>
-            </a:ext>
-            <a:ext uri="{91240B29-F687-4F45-9708-019B960494DF}">
-              <a14:hiddenLine xmlns:a14="http://schemas.microsoft.com/office/drawing/2010/main" w="9525">
-                <a:solidFill>
-                  <a:srgbClr val="000000"/>
-                </a:solidFill>
-                <a:miter lim="800000"/>
-                <a:headEnd/>
-                <a:tailEnd/>
-              </a14:hiddenLine>
-            </a:ext>
-          </a:extLst>
-        </p:spPr>
-      </p:pic>
-    </p:spTree>
-    <p:extLst>
-      <p:ext uri="{BB962C8B-B14F-4D97-AF65-F5344CB8AC3E}">
-        <p14:creationId xmlns:p14="http://schemas.microsoft.com/office/powerpoint/2010/main" val="769877466"/>
-      </p:ext>
-    </p:extLst>
-  </p:cSld>
-  <p:clrMapOvr>
-    <a:masterClrMapping/>
-  </p:clrMapOvr>
-</p:sld>
-</file>
-
-<file path=ppt/slides/slide22.xml><?xml version="1.0" encoding="utf-8"?>
-<p:sld xmlns:a="http://schemas.openxmlformats.org/drawingml/2006/main" xmlns:r="http://schemas.openxmlformats.org/officeDocument/2006/relationships" xmlns:p="http://schemas.openxmlformats.org/presentationml/2006/main">
-  <p:cSld>
-    <p:spTree>
-      <p:nvGrpSpPr>
-        <p:cNvPr id="1" name=""/>
-        <p:cNvGrpSpPr/>
-        <p:nvPr/>
-      </p:nvGrpSpPr>
-      <p:grpSpPr>
-        <a:xfrm>
-          <a:off x="0" y="0"/>
-          <a:ext cx="0" cy="0"/>
-          <a:chOff x="0" y="0"/>
-          <a:chExt cx="0" cy="0"/>
-        </a:xfrm>
-      </p:grpSpPr>
-      <p:sp>
-        <p:nvSpPr>
-          <p:cNvPr id="2" name="Title 1"/>
-          <p:cNvSpPr>
-            <a:spLocks noGrp="1"/>
-          </p:cNvSpPr>
-          <p:nvPr>
-            <p:ph type="title"/>
-          </p:nvPr>
-        </p:nvSpPr>
-        <p:spPr>
-          <a:xfrm>
-            <a:off x="1707468" y="2706062"/>
-            <a:ext cx="9404723" cy="1400530"/>
-          </a:xfrm>
-        </p:spPr>
-        <p:txBody>
-          <a:bodyPr/>
-          <a:lstStyle/>
-          <a:p>
-            <a:r>
-              <a:rPr lang="sr-Latn-RS" sz="7200" dirty="0" smtClean="0"/>
-              <a:t>Hvala na pažnji</a:t>
-            </a:r>
-            <a:endParaRPr lang="en-US" sz="7200" dirty="0"/>
-          </a:p>
-        </p:txBody>
-      </p:sp>
     </p:spTree>
     <p:extLst>
       <p:ext uri="{BB962C8B-B14F-4D97-AF65-F5344CB8AC3E}">
@@ -8461,42 +8261,10 @@
           <a:lstStyle/>
           <a:p>
             <a:r>
-              <a:rPr lang="en-US" dirty="0" err="1" smtClean="0"/>
-              <a:t>Arhitektura</a:t>
-            </a:r>
-            <a:r>
-              <a:rPr lang="en-US" dirty="0" smtClean="0"/>
-              <a:t> </a:t>
-            </a:r>
-            <a:r>
-              <a:rPr lang="en-US" dirty="0" err="1"/>
-              <a:t>potpuno</a:t>
-            </a:r>
-            <a:r>
-              <a:rPr lang="en-US" dirty="0"/>
-              <a:t> </a:t>
-            </a:r>
-            <a:r>
-              <a:rPr lang="en-US" dirty="0" err="1"/>
-              <a:t>distribuiranih</a:t>
-            </a:r>
-            <a:r>
-              <a:rPr lang="en-US" dirty="0"/>
-              <a:t> </a:t>
-            </a:r>
-            <a:r>
-              <a:rPr lang="en-US" dirty="0" err="1"/>
-              <a:t>baza</a:t>
-            </a:r>
-            <a:r>
-              <a:rPr lang="en-US" dirty="0"/>
-              <a:t> </a:t>
-            </a:r>
-            <a:r>
-              <a:rPr lang="en-US" dirty="0" err="1"/>
-              <a:t>podataka</a:t>
-            </a:r>
-            <a:endParaRPr lang="en-US" dirty="0"/>
+              <a:rPr lang="sr-Latn-RS" dirty="0" smtClean="0"/>
+              <a:t>Arhitektura potpuno distribuiranih baza podataka</a:t>
+            </a:r>
+            <a:endParaRPr lang="sr-Latn-RS" dirty="0"/>
           </a:p>
         </p:txBody>
       </p:sp>
@@ -8530,18 +8298,18 @@
             </a:r>
             <a:r>
               <a:rPr lang="sr-Latn-RS" dirty="0"/>
-              <a:t>) koji prikazuje logičku strukturu podataka distribuiranih po svim čvorovima </a:t>
-            </a:r>
-            <a:r>
-              <a:rPr lang="sr-Latn-RS" dirty="0" smtClean="0"/>
-              <a:t>sistema</a:t>
+              <a:t>) </a:t>
             </a:r>
             <a:endParaRPr lang="en-US" dirty="0" smtClean="0"/>
           </a:p>
           <a:p>
             <a:r>
               <a:rPr lang="sr-Latn-RS" dirty="0" smtClean="0"/>
-              <a:t>Globalna šema - </a:t>
+              <a:t>Globalna </a:t>
+            </a:r>
+            <a:r>
+              <a:rPr lang="sr-Latn-RS" dirty="0" smtClean="0"/>
+              <a:t>šema - </a:t>
             </a:r>
             <a:r>
               <a:rPr lang="pl-PL" dirty="0"/>
@@ -8555,30 +8323,25 @@
           <a:p>
             <a:r>
               <a:rPr lang="sr-Latn-RS" dirty="0" smtClean="0"/>
-              <a:t>Svaki </a:t>
+              <a:t>Logička </a:t>
             </a:r>
             <a:r>
               <a:rPr lang="sr-Latn-RS" dirty="0"/>
-              <a:t>čvor </a:t>
-            </a:r>
-            <a:r>
-              <a:rPr lang="sr-Latn-RS" dirty="0" smtClean="0"/>
-              <a:t>poseduje </a:t>
-            </a:r>
+              <a:t>organizacija podataka u svakom čvoru je definisana lokalnom konceptualnom </a:t>
+            </a:r>
+            <a:r>
+              <a:rPr lang="sr-Latn-RS" dirty="0" smtClean="0"/>
+              <a:t>šemom</a:t>
+            </a:r>
+            <a:endParaRPr lang="en-US" dirty="0" smtClean="0"/>
+          </a:p>
+          <a:p>
             <a:r>
               <a:rPr lang="sr-Latn-RS" dirty="0"/>
-              <a:t>svoju lokalnu internu </a:t>
-            </a:r>
-            <a:r>
-              <a:rPr lang="sr-Latn-RS" dirty="0" smtClean="0"/>
-              <a:t>šemu</a:t>
-            </a:r>
-          </a:p>
-          <a:p>
-            <a:r>
-              <a:rPr lang="sr-Latn-RS" dirty="0"/>
-              <a:t>Logička organizacija podataka u svakom čvoru je definisana lokalnom konceptualnom šemom</a:t>
-            </a:r>
+              <a:t>Svaki čvor poseduje svoju lokalnu internu šemu</a:t>
+            </a:r>
+          </a:p>
+          <a:p>
             <a:endParaRPr lang="en-US" b="1" dirty="0"/>
           </a:p>
         </p:txBody>
@@ -8606,8 +8369,8 @@
         </p:blipFill>
         <p:spPr bwMode="auto">
           <a:xfrm>
-            <a:off x="8087096" y="2973032"/>
-            <a:ext cx="3927475" cy="3475037"/>
+            <a:off x="7903030" y="2810170"/>
+            <a:ext cx="4111542" cy="3637900"/>
           </a:xfrm>
           <a:prstGeom prst="rect">
             <a:avLst/>
@@ -8690,8 +8453,8 @@
           <a:lstStyle/>
           <a:p>
             <a:r>
-              <a:rPr lang="sr-Latn-RS" dirty="0"/>
-              <a:t>Arhitektura federativnih baza podataka</a:t>
+              <a:rPr lang="sr-Latn-RS" dirty="0" smtClean="0"/>
+              <a:t>Fragmentacija i replikacija podataka</a:t>
             </a:r>
             <a:endParaRPr lang="en-US" dirty="0"/>
           </a:p>
@@ -8707,137 +8470,83 @@
             <p:ph idx="1"/>
           </p:nvPr>
         </p:nvSpPr>
-        <p:spPr>
-          <a:xfrm>
-            <a:off x="1103313" y="2052918"/>
-            <a:ext cx="7252678" cy="4195481"/>
-          </a:xfrm>
-        </p:spPr>
+        <p:spPr/>
         <p:txBody>
           <a:bodyPr/>
           <a:lstStyle/>
           <a:p>
-            <a:r>
-              <a:rPr lang="sr-Latn-RS" dirty="0" smtClean="0"/>
-              <a:t>Konceptualna </a:t>
-            </a:r>
-            <a:r>
-              <a:rPr lang="sr-Latn-RS" dirty="0"/>
-              <a:t>šema komponente </a:t>
-            </a:r>
-            <a:r>
-              <a:rPr lang="sr-Latn-RS" dirty="0" smtClean="0"/>
-              <a:t>pojedinačne baze podataka</a:t>
-            </a:r>
-          </a:p>
-          <a:p>
-            <a:r>
-              <a:rPr lang="sr-Latn-RS" dirty="0" err="1" smtClean="0"/>
-              <a:t>Komponentna</a:t>
-            </a:r>
-            <a:r>
-              <a:rPr lang="sr-Latn-RS" dirty="0" smtClean="0"/>
-              <a:t> </a:t>
-            </a:r>
-            <a:r>
-              <a:rPr lang="sr-Latn-RS" dirty="0"/>
-              <a:t>šema je izvedena prevođenjem lokalne šeme u </a:t>
-            </a:r>
-            <a:r>
-              <a:rPr lang="sr-Latn-RS" dirty="0" smtClean="0"/>
-              <a:t>zajednički </a:t>
-            </a:r>
-            <a:r>
-              <a:rPr lang="sr-Latn-RS" dirty="0"/>
-              <a:t>model podataka </a:t>
-            </a:r>
-            <a:endParaRPr lang="sr-Latn-RS" dirty="0" smtClean="0"/>
-          </a:p>
-          <a:p>
-            <a:r>
-              <a:rPr lang="sr-Latn-RS" dirty="0"/>
-              <a:t>Eksportovana šema predstavlja podskup </a:t>
-            </a:r>
-            <a:r>
-              <a:rPr lang="sr-Latn-RS" dirty="0" err="1"/>
-              <a:t>komponentne</a:t>
-            </a:r>
-            <a:r>
-              <a:rPr lang="sr-Latn-RS" dirty="0"/>
-              <a:t> šeme koji je dostupan </a:t>
-            </a:r>
-            <a:r>
-              <a:rPr lang="sr-Latn-RS" dirty="0" smtClean="0"/>
-              <a:t>FDBS-u</a:t>
-            </a:r>
-          </a:p>
-          <a:p>
-            <a:r>
-              <a:rPr lang="sr-Latn-RS" dirty="0"/>
-              <a:t>Federativna šema je globalna šema ili pogled koja nastaje kao rezultat integracije svih eksportovanih šema</a:t>
+            <a:pPr marL="0" indent="0">
+              <a:buNone/>
+            </a:pPr>
+            <a:r>
+              <a:rPr lang="sr-Latn-RS" dirty="0" smtClean="0"/>
+              <a:t>Tipovi fragmentacije podataka kod distribuiranih baza podataka:</a:t>
+            </a:r>
+          </a:p>
+          <a:p>
+            <a:r>
+              <a:rPr lang="sr-Latn-RS" dirty="0" smtClean="0"/>
+              <a:t>Horizontalna</a:t>
+            </a:r>
+          </a:p>
+          <a:p>
+            <a:r>
+              <a:rPr lang="sr-Latn-RS" dirty="0" smtClean="0"/>
+              <a:t>Vertikalna</a:t>
+            </a:r>
+          </a:p>
+          <a:p>
+            <a:r>
+              <a:rPr lang="sr-Latn-RS" dirty="0" smtClean="0"/>
+              <a:t>Kombinovana</a:t>
+            </a:r>
+          </a:p>
+          <a:p>
+            <a:pPr marL="0" indent="0">
+              <a:buNone/>
+            </a:pPr>
+            <a:r>
+              <a:rPr lang="sr-Latn-RS" dirty="0" smtClean="0"/>
+              <a:t>Vrste replikacije podataka:</a:t>
+            </a:r>
+          </a:p>
+          <a:p>
+            <a:r>
+              <a:rPr lang="sr-Latn-RS" dirty="0" smtClean="0"/>
+              <a:t>Potpuno replicirana baza podataka</a:t>
+            </a:r>
+          </a:p>
+          <a:p>
+            <a:r>
+              <a:rPr lang="sr-Latn-RS" dirty="0" smtClean="0"/>
+              <a:t>Sistemi bez </a:t>
+            </a:r>
+            <a:r>
+              <a:rPr lang="sr-Latn-RS" dirty="0" smtClean="0"/>
+              <a:t>replikacije </a:t>
+            </a:r>
+            <a:r>
+              <a:rPr lang="sr-Latn-RS" dirty="0" smtClean="0"/>
+              <a:t>podataka</a:t>
+            </a:r>
+          </a:p>
+          <a:p>
+            <a:r>
+              <a:rPr lang="sr-Latn-RS" dirty="0" smtClean="0"/>
+              <a:t>Sistemi sa </a:t>
+            </a:r>
+            <a:r>
+              <a:rPr lang="sr-Latn-RS" dirty="0" smtClean="0"/>
+              <a:t>delimičnom replikacijom</a:t>
             </a:r>
             <a:endParaRPr lang="en-US" dirty="0"/>
           </a:p>
         </p:txBody>
       </p:sp>
-      <p:pic>
-        <p:nvPicPr>
-          <p:cNvPr id="3074" name="Picture 2" descr="Screenshot_6"/>
-          <p:cNvPicPr>
-            <a:picLocks noChangeAspect="1" noChangeArrowheads="1"/>
-          </p:cNvPicPr>
-          <p:nvPr/>
-        </p:nvPicPr>
-        <p:blipFill>
-          <a:blip r:embed="rId2">
-            <a:extLst>
-              <a:ext uri="{28A0092B-C50C-407E-A947-70E740481C1C}">
-                <a14:useLocalDpi xmlns:a14="http://schemas.microsoft.com/office/drawing/2010/main" val="0"/>
-              </a:ext>
-            </a:extLst>
-          </a:blip>
-          <a:srcRect/>
-          <a:stretch>
-            <a:fillRect/>
-          </a:stretch>
-        </p:blipFill>
-        <p:spPr bwMode="auto">
-          <a:xfrm>
-            <a:off x="8355990" y="2321858"/>
-            <a:ext cx="3387725" cy="3657600"/>
-          </a:xfrm>
-          <a:prstGeom prst="rect">
-            <a:avLst/>
-          </a:prstGeom>
-          <a:noFill/>
-          <a:ln>
-            <a:noFill/>
-          </a:ln>
-          <a:extLst>
-            <a:ext uri="{909E8E84-426E-40DD-AFC4-6F175D3DCCD1}">
-              <a14:hiddenFill xmlns:a14="http://schemas.microsoft.com/office/drawing/2010/main">
-                <a:solidFill>
-                  <a:srgbClr val="FFFFFF"/>
-                </a:solidFill>
-              </a14:hiddenFill>
-            </a:ext>
-            <a:ext uri="{91240B29-F687-4F45-9708-019B960494DF}">
-              <a14:hiddenLine xmlns:a14="http://schemas.microsoft.com/office/drawing/2010/main" w="9525">
-                <a:solidFill>
-                  <a:srgbClr val="000000"/>
-                </a:solidFill>
-                <a:miter lim="800000"/>
-                <a:headEnd/>
-                <a:tailEnd/>
-              </a14:hiddenLine>
-            </a:ext>
-          </a:extLst>
-        </p:spPr>
-      </p:pic>
     </p:spTree>
     <p:extLst>
       <p:ext uri="{BB962C8B-B14F-4D97-AF65-F5344CB8AC3E}">
-        <p14:creationId xmlns:p14="http://schemas.microsoft.com/office/powerpoint/2010/main" val="59366346"/>
+        <p14:creationId xmlns:p14="http://schemas.microsoft.com/office/powerpoint/2010/main" val="3200606618"/>
       </p:ext>
     </p:extLst>
   </p:cSld>
@@ -8888,7 +8597,15 @@
           <a:p>
             <a:r>
               <a:rPr lang="sr-Latn-RS" dirty="0" smtClean="0"/>
-              <a:t>Fragmentacija i replikacija podataka</a:t>
+              <a:t>Obrada </a:t>
+            </a:r>
+            <a:r>
+              <a:rPr lang="pl-PL" dirty="0" smtClean="0"/>
+              <a:t>i </a:t>
+            </a:r>
+            <a:r>
+              <a:rPr lang="pl-PL" dirty="0"/>
+              <a:t>optimizacija upita u distribuiranim bazama podataka</a:t>
             </a:r>
             <a:endParaRPr lang="en-US" dirty="0"/>
           </a:p>
@@ -8914,68 +8631,48 @@
             </a:pPr>
             <a:r>
               <a:rPr lang="sr-Latn-RS" dirty="0" smtClean="0"/>
-              <a:t>Tipovi fragmentacije podataka kod distribuiranih baza podataka:</a:t>
-            </a:r>
-          </a:p>
-          <a:p>
-            <a:r>
-              <a:rPr lang="sr-Latn-RS" dirty="0" smtClean="0"/>
-              <a:t>Horizontalna</a:t>
-            </a:r>
-          </a:p>
-          <a:p>
-            <a:r>
-              <a:rPr lang="sr-Latn-RS" dirty="0" smtClean="0"/>
-              <a:t>Vertikalna</a:t>
-            </a:r>
-          </a:p>
-          <a:p>
-            <a:r>
-              <a:rPr lang="sr-Latn-RS" dirty="0" smtClean="0"/>
-              <a:t>Kombinovana</a:t>
-            </a:r>
-          </a:p>
-          <a:p>
-            <a:pPr marL="0" indent="0">
-              <a:buNone/>
-            </a:pPr>
-            <a:r>
-              <a:rPr lang="sr-Latn-RS" dirty="0" smtClean="0"/>
-              <a:t>Vrste replikacije podataka:</a:t>
-            </a:r>
-          </a:p>
-          <a:p>
-            <a:r>
-              <a:rPr lang="sr-Latn-RS" dirty="0" smtClean="0"/>
-              <a:t>Potpuno replicirana baza podataka</a:t>
-            </a:r>
-          </a:p>
-          <a:p>
-            <a:r>
-              <a:rPr lang="sr-Latn-RS" dirty="0" smtClean="0"/>
-              <a:t>Sistemi bez </a:t>
-            </a:r>
-            <a:r>
-              <a:rPr lang="sr-Latn-RS" dirty="0" err="1" smtClean="0"/>
-              <a:t>repliciranih</a:t>
-            </a:r>
-            <a:r>
-              <a:rPr lang="sr-Latn-RS" dirty="0" smtClean="0"/>
-              <a:t> podataka</a:t>
-            </a:r>
-          </a:p>
-          <a:p>
-            <a:r>
-              <a:rPr lang="sr-Latn-RS" dirty="0" smtClean="0"/>
-              <a:t>Sistemi sa delimično </a:t>
-            </a:r>
-            <a:r>
-              <a:rPr lang="sr-Latn-RS" dirty="0" err="1" smtClean="0"/>
-              <a:t>repliciranim</a:t>
-            </a:r>
-            <a:r>
-              <a:rPr lang="sr-Latn-RS" dirty="0" smtClean="0"/>
-              <a:t> podacima</a:t>
+              <a:t>Obrada upita odvija se kroz sledeće faze:</a:t>
+            </a:r>
+          </a:p>
+          <a:p>
+            <a:r>
+              <a:rPr lang="sr-Latn-RS" dirty="0" smtClean="0"/>
+              <a:t>Mapiranje </a:t>
+            </a:r>
+            <a:r>
+              <a:rPr lang="sr-Latn-RS" dirty="0"/>
+              <a:t>upita </a:t>
+            </a:r>
+            <a:endParaRPr lang="sr-Latn-RS" dirty="0" smtClean="0"/>
+          </a:p>
+          <a:p>
+            <a:r>
+              <a:rPr lang="sr-Latn-RS" dirty="0"/>
+              <a:t>Lokalizacija </a:t>
+            </a:r>
+            <a:endParaRPr lang="sr-Latn-RS" dirty="0" smtClean="0"/>
+          </a:p>
+          <a:p>
+            <a:r>
+              <a:rPr lang="sr-Latn-RS" dirty="0"/>
+              <a:t>Globalni optimizator upita </a:t>
+            </a:r>
+            <a:endParaRPr lang="sr-Latn-RS" dirty="0" smtClean="0"/>
+          </a:p>
+          <a:p>
+            <a:r>
+              <a:rPr lang="sr-Latn-RS" dirty="0"/>
+              <a:t>Lokalna optimizacija upita </a:t>
+            </a:r>
+            <a:endParaRPr lang="sr-Latn-RS" dirty="0" smtClean="0"/>
+          </a:p>
+          <a:p>
+            <a:endParaRPr lang="sr-Latn-RS" dirty="0"/>
+          </a:p>
+          <a:p>
+            <a:r>
+              <a:rPr lang="sr-Latn-RS" dirty="0"/>
+              <a:t>Obrada distribuiranih upita primenom SEMIJOIN</a:t>
             </a:r>
             <a:endParaRPr lang="en-US" dirty="0"/>
           </a:p>
@@ -8984,7 +8681,7 @@
     </p:spTree>
     <p:extLst>
       <p:ext uri="{BB962C8B-B14F-4D97-AF65-F5344CB8AC3E}">
-        <p14:creationId xmlns:p14="http://schemas.microsoft.com/office/powerpoint/2010/main" val="3200606618"/>
+        <p14:creationId xmlns:p14="http://schemas.microsoft.com/office/powerpoint/2010/main" val="2589694801"/>
       </p:ext>
     </p:extLst>
   </p:cSld>
@@ -9034,16 +8731,12 @@
           <a:lstStyle/>
           <a:p>
             <a:r>
-              <a:rPr lang="sr-Latn-RS" dirty="0" smtClean="0"/>
+              <a:rPr lang="pl-PL" dirty="0" smtClean="0"/>
               <a:t>Obrada </a:t>
             </a:r>
             <a:r>
-              <a:rPr lang="pl-PL" dirty="0" smtClean="0"/>
-              <a:t>i </a:t>
-            </a:r>
-            <a:r>
               <a:rPr lang="pl-PL" dirty="0"/>
-              <a:t>optimizacija upita u distribuiranim bazama podataka</a:t>
+              <a:t>transakcija u distribuiranim bazama podataka</a:t>
             </a:r>
             <a:endParaRPr lang="en-US" dirty="0"/>
           </a:p>
@@ -9064,62 +8757,81 @@
           <a:bodyPr/>
           <a:lstStyle/>
           <a:p>
+            <a:r>
+              <a:rPr lang="sr-Latn-RS" dirty="0" smtClean="0"/>
+              <a:t>Globalni menadžer transakcija obezbeđuje podršku za distribuirane transakcije</a:t>
+            </a:r>
+          </a:p>
+          <a:p>
+            <a:r>
+              <a:rPr lang="sr-Latn-RS" dirty="0" smtClean="0"/>
+              <a:t>Globalni i lokalni menadžeri transakcija komuniciraju sa menadžerima za upravljanje konkurentnim pristupom i oporavka DDBMS-a kako bi obezbedili ACID svojstva</a:t>
+            </a:r>
+          </a:p>
+          <a:p>
             <a:pPr marL="0" indent="0">
               <a:buNone/>
             </a:pPr>
             <a:r>
               <a:rPr lang="sr-Latn-RS" dirty="0" smtClean="0"/>
-              <a:t>Obrada upita odvija se kroz sledeće faze:</a:t>
-            </a:r>
-          </a:p>
-          <a:p>
-            <a:r>
-              <a:rPr lang="sr-Latn-RS" dirty="0" smtClean="0"/>
-              <a:t>Mapiranje </a:t>
-            </a:r>
-            <a:r>
-              <a:rPr lang="sr-Latn-RS" dirty="0"/>
-              <a:t>upita </a:t>
+              <a:t>Implementacije distribuiranih transakcija:</a:t>
+            </a:r>
+          </a:p>
+          <a:p>
+            <a:r>
+              <a:rPr lang="sr-Latn-RS" dirty="0" smtClean="0"/>
+              <a:t>Protokol</a:t>
+            </a:r>
+            <a:r>
+              <a:rPr lang="en-US" dirty="0" smtClean="0"/>
+              <a:t> </a:t>
+            </a:r>
+            <a:r>
+              <a:rPr lang="sr-Latn-RS" dirty="0" smtClean="0"/>
+              <a:t>dvofaznog</a:t>
+            </a:r>
+            <a:r>
+              <a:rPr lang="en-US" dirty="0" smtClean="0"/>
+              <a:t> </a:t>
+            </a:r>
+            <a:r>
+              <a:rPr lang="en-US" dirty="0"/>
+              <a:t>commit-a (Two-phase commit protocol</a:t>
+            </a:r>
+            <a:r>
+              <a:rPr lang="en-US" dirty="0" smtClean="0"/>
+              <a:t>)</a:t>
             </a:r>
             <a:endParaRPr lang="sr-Latn-RS" dirty="0" smtClean="0"/>
           </a:p>
           <a:p>
             <a:r>
-              <a:rPr lang="sr-Latn-RS" dirty="0"/>
-              <a:t>Lokalizacija </a:t>
-            </a:r>
-            <a:endParaRPr lang="sr-Latn-RS" dirty="0" smtClean="0"/>
-          </a:p>
-          <a:p>
-            <a:r>
-              <a:rPr lang="sr-Latn-RS" dirty="0"/>
-              <a:t>Globalni optimizator upita </a:t>
-            </a:r>
-            <a:endParaRPr lang="sr-Latn-RS" dirty="0" smtClean="0"/>
-          </a:p>
-          <a:p>
-            <a:r>
-              <a:rPr lang="sr-Latn-RS" dirty="0"/>
-              <a:t>Lokalna optimizacija upita </a:t>
-            </a:r>
-            <a:endParaRPr lang="sr-Latn-RS" dirty="0" smtClean="0"/>
-          </a:p>
-          <a:p>
-            <a:endParaRPr lang="sr-Latn-RS" dirty="0"/>
-          </a:p>
-          <a:p>
-            <a:r>
-              <a:rPr lang="sr-Latn-RS" dirty="0"/>
-              <a:t>Obrada distribuiranih upita primenom SEMIJOIN</a:t>
-            </a:r>
-            <a:endParaRPr lang="en-US" dirty="0"/>
+              <a:rPr lang="sr-Latn-RS" dirty="0" smtClean="0"/>
+              <a:t>Protokol</a:t>
+            </a:r>
+            <a:r>
+              <a:rPr lang="en-US" dirty="0" smtClean="0"/>
+              <a:t> </a:t>
+            </a:r>
+            <a:r>
+              <a:rPr lang="sr-Latn-RS" dirty="0" smtClean="0"/>
+              <a:t>trofaznog</a:t>
+            </a:r>
+            <a:r>
+              <a:rPr lang="en-US" dirty="0" smtClean="0"/>
+              <a:t> </a:t>
+            </a:r>
+            <a:r>
+              <a:rPr lang="en-US" dirty="0"/>
+              <a:t>commit-a (Three-phase commit protocol)</a:t>
+            </a:r>
           </a:p>
         </p:txBody>
       </p:sp>
     </p:spTree>
     <p:extLst>
       <p:ext uri="{BB962C8B-B14F-4D97-AF65-F5344CB8AC3E}">
-        <p14:creationId xmlns:p14="http://schemas.microsoft.com/office/powerpoint/2010/main" val="2589694801"/>
+        <p14:creationId xmlns:p14="http://schemas.microsoft.com/office/powerpoint/2010/main" val="2687132600"/>
       </p:ext>
     </p:extLst>
   </p:cSld>
@@ -9169,12 +8881,8 @@
           <a:lstStyle/>
           <a:p>
             <a:r>
-              <a:rPr lang="pl-PL" dirty="0" smtClean="0"/>
-              <a:t>Obrada </a:t>
-            </a:r>
-            <a:r>
-              <a:rPr lang="pl-PL" dirty="0"/>
-              <a:t>transakcija u distribuiranim bazama podataka</a:t>
+              <a:rPr lang="sr-Latn-RS" dirty="0" smtClean="0"/>
+              <a:t>Tehnike konkurentnog pristupa podacima u distribuiranom sistemu</a:t>
             </a:r>
             <a:endParaRPr lang="en-US" dirty="0"/>
           </a:p>
@@ -9196,51 +8904,52 @@
           <a:lstStyle/>
           <a:p>
             <a:r>
-              <a:rPr lang="en-US" dirty="0" err="1" smtClean="0"/>
-              <a:t>Protokol</a:t>
-            </a:r>
-            <a:r>
-              <a:rPr lang="en-US" dirty="0" smtClean="0"/>
-              <a:t> </a:t>
-            </a:r>
-            <a:r>
-              <a:rPr lang="en-US" dirty="0" err="1"/>
-              <a:t>dvofaznog</a:t>
-            </a:r>
-            <a:r>
-              <a:rPr lang="en-US" dirty="0"/>
-              <a:t> commit-a (Two-phase commit protocol</a:t>
-            </a:r>
-            <a:r>
-              <a:rPr lang="en-US" dirty="0" smtClean="0"/>
-              <a:t>)</a:t>
+              <a:rPr lang="sr-Latn-RS" dirty="0" smtClean="0"/>
+              <a:t>Tehnike </a:t>
+            </a:r>
+            <a:r>
+              <a:rPr lang="sr-Latn-RS" dirty="0"/>
+              <a:t>koje se koriste za implementaciju konkurentnog pristupa nadograđuju tehnike koje se koriste u centralizovanim sistemima</a:t>
             </a:r>
             <a:endParaRPr lang="sr-Latn-RS" dirty="0" smtClean="0"/>
           </a:p>
           <a:p>
             <a:r>
-              <a:rPr lang="en-US" dirty="0" err="1" smtClean="0"/>
-              <a:t>Protokol</a:t>
-            </a:r>
-            <a:r>
-              <a:rPr lang="en-US" dirty="0" smtClean="0"/>
-              <a:t> </a:t>
-            </a:r>
-            <a:r>
-              <a:rPr lang="en-US" dirty="0" err="1"/>
-              <a:t>trofaznog</a:t>
-            </a:r>
-            <a:r>
-              <a:rPr lang="en-US" dirty="0"/>
-              <a:t> commit-a (Three-phase commit protocol)</a:t>
-            </a:r>
+              <a:rPr lang="sr-Latn-RS" dirty="0" smtClean="0"/>
+              <a:t>Tehnika </a:t>
+            </a:r>
+            <a:r>
+              <a:rPr lang="sr-Latn-RS" dirty="0" smtClean="0"/>
+              <a:t>primarnog čvora</a:t>
+            </a:r>
+          </a:p>
+          <a:p>
+            <a:r>
+              <a:rPr lang="sr-Latn-RS" dirty="0" smtClean="0"/>
+              <a:t>Primarni čvor sa rezervnim čvorom</a:t>
+            </a:r>
+          </a:p>
+          <a:p>
+            <a:r>
+              <a:rPr lang="sr-Latn-RS" dirty="0" smtClean="0"/>
+              <a:t>Tehnika primarne kopije</a:t>
+            </a:r>
+          </a:p>
+          <a:p>
+            <a:r>
+              <a:rPr lang="sr-Latn-RS" dirty="0" smtClean="0"/>
+              <a:t>Upravljanje zasnovano na glasanju</a:t>
+            </a:r>
+          </a:p>
+          <a:p>
+            <a:endParaRPr lang="en-US" dirty="0"/>
           </a:p>
         </p:txBody>
       </p:sp>
     </p:spTree>
     <p:extLst>
       <p:ext uri="{BB962C8B-B14F-4D97-AF65-F5344CB8AC3E}">
-        <p14:creationId xmlns:p14="http://schemas.microsoft.com/office/powerpoint/2010/main" val="2687132600"/>
+        <p14:creationId xmlns:p14="http://schemas.microsoft.com/office/powerpoint/2010/main" val="2711206944"/>
       </p:ext>
     </p:extLst>
   </p:cSld>
@@ -9291,7 +9000,7 @@
           <a:p>
             <a:r>
               <a:rPr lang="sr-Latn-RS" dirty="0" smtClean="0"/>
-              <a:t>Tehnike konkurentnog pristupa podacima u distribuiranom sistemu</a:t>
+              <a:t>Couchbase baza podataka</a:t>
             </a:r>
             <a:endParaRPr lang="en-US" dirty="0"/>
           </a:p>
@@ -9313,45 +9022,147 @@
           <a:lstStyle/>
           <a:p>
             <a:r>
-              <a:rPr lang="sr-Latn-RS" dirty="0" smtClean="0"/>
-              <a:t>Tehnika</a:t>
+              <a:rPr lang="en-US" dirty="0"/>
+              <a:t>Couchbase je open source </a:t>
+            </a:r>
+            <a:r>
+              <a:rPr lang="sr-Latn-RS" dirty="0" smtClean="0"/>
+              <a:t>distribuirana baza podataka, nastala</a:t>
+            </a:r>
+            <a:r>
+              <a:rPr lang="en-US" dirty="0" smtClean="0"/>
+              <a:t> </a:t>
+            </a:r>
+            <a:r>
+              <a:rPr lang="sr-Latn-RS" dirty="0" smtClean="0"/>
+              <a:t>spajanjem</a:t>
+            </a:r>
+            <a:r>
+              <a:rPr lang="en-US" dirty="0" smtClean="0"/>
+              <a:t> </a:t>
+            </a:r>
+            <a:r>
+              <a:rPr lang="sr-Latn-RS" dirty="0" smtClean="0"/>
+              <a:t>dva rešenja baze podataka </a:t>
+            </a:r>
+            <a:r>
+              <a:rPr lang="en-US" dirty="0" smtClean="0"/>
+              <a:t>– </a:t>
+            </a:r>
+            <a:r>
+              <a:rPr lang="sr-Latn-RS" dirty="0" err="1"/>
+              <a:t>CouchDB</a:t>
+            </a:r>
+            <a:r>
+              <a:rPr lang="en-US" dirty="0"/>
+              <a:t> </a:t>
+            </a:r>
+            <a:r>
+              <a:rPr lang="en-US" dirty="0" err="1"/>
+              <a:t>i</a:t>
+            </a:r>
+            <a:r>
+              <a:rPr lang="en-US" dirty="0"/>
+              <a:t> </a:t>
+            </a:r>
+            <a:r>
+              <a:rPr lang="en-US" dirty="0" err="1"/>
+              <a:t>Membase</a:t>
+            </a:r>
+            <a:endParaRPr lang="en-US" dirty="0"/>
+          </a:p>
+          <a:p>
+            <a:r>
+              <a:rPr lang="en-US" dirty="0" smtClean="0"/>
+              <a:t>S</a:t>
+            </a:r>
+            <a:r>
+              <a:rPr lang="sr-Latn-RS" dirty="0" smtClean="0"/>
+              <a:t>pada </a:t>
             </a:r>
             <a:r>
               <a:rPr lang="sr-Latn-RS" dirty="0"/>
-              <a:t> </a:t>
-            </a:r>
-            <a:r>
-              <a:rPr lang="sr-Latn-RS" dirty="0" smtClean="0"/>
-              <a:t>primarnog čvora</a:t>
-            </a:r>
-          </a:p>
-          <a:p>
-            <a:r>
-              <a:rPr lang="sr-Latn-RS" dirty="0" smtClean="0"/>
-              <a:t>Primarni čvor sa rezervnim čvorom</a:t>
-            </a:r>
-          </a:p>
-          <a:p>
-            <a:r>
-              <a:rPr lang="sr-Latn-RS" dirty="0" smtClean="0"/>
-              <a:t>Tehnika primarne kopije</a:t>
-            </a:r>
-          </a:p>
-          <a:p>
-            <a:r>
-              <a:rPr lang="sr-Latn-RS" dirty="0" smtClean="0"/>
-              <a:t>Upravljanje zasnovano na glasanju</a:t>
-            </a:r>
-          </a:p>
-          <a:p>
-            <a:endParaRPr lang="en-US" dirty="0"/>
-          </a:p>
-        </p:txBody>
-      </p:sp>
+              <a:t>u grupu </a:t>
+            </a:r>
+            <a:r>
+              <a:rPr lang="sr-Latn-RS" dirty="0" err="1"/>
+              <a:t>document</a:t>
+            </a:r>
+            <a:r>
+              <a:rPr lang="sr-Latn-RS" dirty="0"/>
+              <a:t> baza </a:t>
+            </a:r>
+            <a:r>
+              <a:rPr lang="sr-Latn-RS" dirty="0" smtClean="0"/>
+              <a:t>podataka</a:t>
+            </a:r>
+            <a:endParaRPr lang="en-US" dirty="0" smtClean="0"/>
+          </a:p>
+          <a:p>
+            <a:r>
+              <a:rPr lang="sr-Latn-RS" dirty="0"/>
+              <a:t>Za predstavljanje upita ka bazi koristi se bogat upitni jezik nazvan </a:t>
+            </a:r>
+            <a:r>
+              <a:rPr lang="sr-Latn-RS" dirty="0" smtClean="0"/>
+              <a:t>N1QL</a:t>
+            </a:r>
+            <a:endParaRPr lang="en-US" dirty="0" smtClean="0"/>
+          </a:p>
+          <a:p>
+            <a:r>
+              <a:rPr lang="sr-Latn-RS" dirty="0"/>
+              <a:t>Podaci se kod Couchbase servera mogu čuvati na dva načina - samo u radnoj memoriji (RAM) ili kombinovano u radnoj memoriji i na </a:t>
+            </a:r>
+            <a:r>
+              <a:rPr lang="sr-Latn-RS" dirty="0" smtClean="0"/>
+              <a:t>disku</a:t>
+            </a:r>
+            <a:endParaRPr lang="en-US" dirty="0" smtClean="0"/>
+          </a:p>
+          <a:p>
+            <a:r>
+              <a:rPr lang="sr-Latn-RS" dirty="0" smtClean="0"/>
+              <a:t>Po CAP teoremi se može svrstati u CP ili AP</a:t>
+            </a:r>
+            <a:endParaRPr lang="sr-Latn-RS" dirty="0"/>
+          </a:p>
+        </p:txBody>
+      </p:sp>
+      <p:pic>
+        <p:nvPicPr>
+          <p:cNvPr id="4" name="Picture 3"/>
+          <p:cNvPicPr>
+            <a:picLocks noChangeAspect="1"/>
+          </p:cNvPicPr>
+          <p:nvPr/>
+        </p:nvPicPr>
+        <p:blipFill>
+          <a:blip r:embed="rId2">
+            <a:extLst>
+              <a:ext uri="{28A0092B-C50C-407E-A947-70E740481C1C}">
+                <a14:useLocalDpi xmlns:a14="http://schemas.microsoft.com/office/drawing/2010/main" val="0"/>
+              </a:ext>
+            </a:extLst>
+          </a:blip>
+          <a:stretch>
+            <a:fillRect/>
+          </a:stretch>
+        </p:blipFill>
+        <p:spPr>
+          <a:xfrm>
+            <a:off x="9492183" y="5792338"/>
+            <a:ext cx="2580233" cy="912121"/>
+          </a:xfrm>
+          <a:prstGeom prst="rect">
+            <a:avLst/>
+          </a:prstGeom>
+        </p:spPr>
+      </p:pic>
     </p:spTree>
     <p:extLst>
       <p:ext uri="{BB962C8B-B14F-4D97-AF65-F5344CB8AC3E}">
-        <p14:creationId xmlns:p14="http://schemas.microsoft.com/office/powerpoint/2010/main" val="2711206944"/>
+        <p14:creationId xmlns:p14="http://schemas.microsoft.com/office/powerpoint/2010/main" val="135268690"/>
       </p:ext>
     </p:extLst>
   </p:cSld>
@@ -9401,14 +9212,22 @@
           <a:lstStyle/>
           <a:p>
             <a:r>
-              <a:rPr lang="pl-PL" dirty="0" smtClean="0"/>
-              <a:t>Katalog </a:t>
-            </a:r>
-            <a:r>
-              <a:rPr lang="pl-PL" dirty="0"/>
-              <a:t>distribuiranih baza podataka </a:t>
-            </a:r>
-            <a:endParaRPr lang="en-US" dirty="0"/>
+              <a:rPr lang="sr-Latn-RS" dirty="0"/>
+              <a:t>Couchbase </a:t>
+            </a:r>
+            <a:r>
+              <a:rPr lang="sr-Latn-RS" dirty="0" smtClean="0"/>
+              <a:t>klaster</a:t>
+            </a:r>
+            <a:r>
+              <a:rPr lang="sr-Latn-RS" dirty="0"/>
+              <a:t> </a:t>
+            </a:r>
+            <a:r>
+              <a:rPr lang="sr-Latn-RS" dirty="0" smtClean="0"/>
+              <a:t>i servisi</a:t>
+            </a:r>
+            <a:endParaRPr lang="sr-Latn-RS" dirty="0"/>
           </a:p>
         </p:txBody>
       </p:sp>
@@ -9428,42 +9247,160 @@
           <a:lstStyle/>
           <a:p>
             <a:r>
-              <a:rPr lang="sr-Latn-RS" dirty="0" smtClean="0"/>
-              <a:t>Centralizovani katalog</a:t>
-            </a:r>
-          </a:p>
-          <a:p>
-            <a:r>
-              <a:rPr lang="sr-Latn-RS" dirty="0" smtClean="0"/>
-              <a:t>Potpuno replcirani katalog</a:t>
-            </a:r>
-          </a:p>
-          <a:p>
-            <a:r>
-              <a:rPr lang="sr-Latn-RS" dirty="0" smtClean="0"/>
-              <a:t>Delimično replicirani katalog</a:t>
+              <a:rPr lang="sr-Latn-RS" dirty="0"/>
+              <a:t>Couchbase klaster se sastoji od jedne ili više instanci Couchbase servera pri čemu se svaki server pokreće na nezavisnom </a:t>
+            </a:r>
+            <a:r>
+              <a:rPr lang="sr-Latn-RS" dirty="0" smtClean="0"/>
+              <a:t>čvoru</a:t>
+            </a:r>
+            <a:endParaRPr lang="en-US" dirty="0" smtClean="0"/>
+          </a:p>
+          <a:p>
+            <a:r>
+              <a:rPr lang="en-US" dirty="0" smtClean="0"/>
+              <a:t>N</a:t>
+            </a:r>
+            <a:r>
+              <a:rPr lang="sr-Latn-RS" dirty="0" smtClean="0"/>
+              <a:t>a </a:t>
+            </a:r>
+            <a:r>
+              <a:rPr lang="sr-Latn-RS" dirty="0"/>
+              <a:t>svakom čvoru je pokrenut Couchbase </a:t>
+            </a:r>
+            <a:r>
+              <a:rPr lang="sr-Latn-RS" dirty="0" err="1"/>
+              <a:t>Cluster</a:t>
+            </a:r>
+            <a:r>
+              <a:rPr lang="sr-Latn-RS" dirty="0"/>
+              <a:t> </a:t>
+            </a:r>
+            <a:r>
+              <a:rPr lang="sr-Latn-RS" dirty="0" err="1"/>
+              <a:t>Manager</a:t>
+            </a:r>
+            <a:r>
+              <a:rPr lang="sr-Latn-RS" dirty="0"/>
+              <a:t> koji upravlja komunikacijom između čvorova i obezbeđuje da su svi čvorovi </a:t>
+            </a:r>
+            <a:r>
+              <a:rPr lang="sr-Latn-RS" dirty="0" smtClean="0"/>
+              <a:t>stabilni</a:t>
+            </a:r>
+          </a:p>
+          <a:p>
+            <a:r>
+              <a:rPr lang="sr-Latn-RS" dirty="0"/>
+              <a:t>Svaki servis se može </a:t>
+            </a:r>
+            <a:r>
+              <a:rPr lang="sr-Latn-RS" dirty="0" err="1"/>
+              <a:t>deploy-ovati</a:t>
+            </a:r>
+            <a:r>
+              <a:rPr lang="sr-Latn-RS" dirty="0"/>
+              <a:t> i održavati nezavisno od ostalih i na taj način obezbeđuje veliku sposobnost </a:t>
+            </a:r>
+            <a:r>
+              <a:rPr lang="sr-Latn-RS" dirty="0" err="1"/>
+              <a:t>skaliranja</a:t>
+            </a:r>
+            <a:r>
+              <a:rPr lang="sr-Latn-RS" dirty="0"/>
+              <a:t> </a:t>
+            </a:r>
+            <a:r>
+              <a:rPr lang="sr-Latn-RS" dirty="0" smtClean="0"/>
+              <a:t>sistema</a:t>
+            </a:r>
+          </a:p>
+          <a:p>
+            <a:r>
+              <a:rPr lang="sr-Latn-RS" dirty="0" smtClean="0"/>
+              <a:t>Couchbase podržava sledeće servise: Data, </a:t>
+            </a:r>
+            <a:r>
+              <a:rPr lang="sr-Latn-RS" dirty="0" err="1" smtClean="0"/>
+              <a:t>Query</a:t>
+            </a:r>
+            <a:r>
+              <a:rPr lang="sr-Latn-RS" dirty="0" smtClean="0"/>
+              <a:t>, </a:t>
+            </a:r>
+            <a:r>
+              <a:rPr lang="sr-Latn-RS" dirty="0" err="1" smtClean="0"/>
+              <a:t>Index</a:t>
+            </a:r>
+            <a:r>
+              <a:rPr lang="sr-Latn-RS" dirty="0" smtClean="0"/>
+              <a:t>, </a:t>
+            </a:r>
+            <a:r>
+              <a:rPr lang="sr-Latn-RS" dirty="0" err="1" smtClean="0"/>
+              <a:t>Search</a:t>
+            </a:r>
+            <a:r>
+              <a:rPr lang="sr-Latn-RS" dirty="0" smtClean="0"/>
+              <a:t>, </a:t>
+            </a:r>
+            <a:r>
+              <a:rPr lang="sr-Latn-RS" dirty="0" err="1" smtClean="0"/>
+              <a:t>Analytics</a:t>
+            </a:r>
+            <a:r>
+              <a:rPr lang="sr-Latn-RS" dirty="0" smtClean="0"/>
+              <a:t>, </a:t>
+            </a:r>
+            <a:r>
+              <a:rPr lang="sr-Latn-RS" dirty="0" err="1" smtClean="0"/>
+              <a:t>Eventing</a:t>
             </a:r>
             <a:endParaRPr lang="en-US" dirty="0"/>
           </a:p>
         </p:txBody>
       </p:sp>
+      <p:pic>
+        <p:nvPicPr>
+          <p:cNvPr id="4" name="Picture 3"/>
+          <p:cNvPicPr>
+            <a:picLocks noChangeAspect="1"/>
+          </p:cNvPicPr>
+          <p:nvPr/>
+        </p:nvPicPr>
+        <p:blipFill>
+          <a:blip r:embed="rId2">
+            <a:extLst>
+              <a:ext uri="{28A0092B-C50C-407E-A947-70E740481C1C}">
+                <a14:useLocalDpi xmlns:a14="http://schemas.microsoft.com/office/drawing/2010/main" val="0"/>
+              </a:ext>
+            </a:extLst>
+          </a:blip>
+          <a:stretch>
+            <a:fillRect/>
+          </a:stretch>
+        </p:blipFill>
+        <p:spPr>
+          <a:xfrm>
+            <a:off x="9492183" y="5792338"/>
+            <a:ext cx="2580233" cy="912121"/>
+          </a:xfrm>
+          <a:prstGeom prst="rect">
+            <a:avLst/>
+          </a:prstGeom>
+        </p:spPr>
+      </p:pic>
     </p:spTree>
     <p:extLst>
       <p:ext uri="{BB962C8B-B14F-4D97-AF65-F5344CB8AC3E}">
-        <p14:creationId xmlns:p14="http://schemas.microsoft.com/office/powerpoint/2010/main" val="2432388057"/>
+        <p14:creationId xmlns:p14="http://schemas.microsoft.com/office/powerpoint/2010/main" val="3174897274"/>
       </p:ext>
     </p:extLst>
   </p:cSld>
   <p:clrMapOvr>
     <a:masterClrMapping/>
   </p:clrMapOvr>
-  <p:timing>
-    <p:tnLst>
-      <p:par>
-        <p:cTn id="1" dur="indefinite" restart="never" nodeType="tmRoot"/>
-      </p:par>
-    </p:tnLst>
-  </p:timing>
 </p:sld>
 </file>
 

</xml_diff>